<commit_message>
note of DRL an overview
</commit_message>
<xml_diff>
--- a/Note_RLGameReviewPapers.pptx
+++ b/Note_RLGameReviewPapers.pptx
@@ -4,6 +4,9 @@
   <p:sldMasterIdLst>
     <p:sldMasterId id="2147483648" r:id="rId1"/>
   </p:sldMasterIdLst>
+  <p:notesMasterIdLst>
+    <p:notesMasterId r:id="rId24"/>
+  </p:notesMasterIdLst>
   <p:sldIdLst>
     <p:sldId id="256" r:id="rId2"/>
     <p:sldId id="257" r:id="rId3"/>
@@ -11,6 +14,22 @@
     <p:sldId id="259" r:id="rId5"/>
     <p:sldId id="260" r:id="rId6"/>
     <p:sldId id="261" r:id="rId7"/>
+    <p:sldId id="262" r:id="rId8"/>
+    <p:sldId id="263" r:id="rId9"/>
+    <p:sldId id="264" r:id="rId10"/>
+    <p:sldId id="265" r:id="rId11"/>
+    <p:sldId id="266" r:id="rId12"/>
+    <p:sldId id="267" r:id="rId13"/>
+    <p:sldId id="268" r:id="rId14"/>
+    <p:sldId id="269" r:id="rId15"/>
+    <p:sldId id="270" r:id="rId16"/>
+    <p:sldId id="271" r:id="rId17"/>
+    <p:sldId id="272" r:id="rId18"/>
+    <p:sldId id="273" r:id="rId19"/>
+    <p:sldId id="274" r:id="rId20"/>
+    <p:sldId id="275" r:id="rId21"/>
+    <p:sldId id="276" r:id="rId22"/>
+    <p:sldId id="277" r:id="rId23"/>
   </p:sldIdLst>
   <p:sldSz cx="12192000" cy="6858000"/>
   <p:notesSz cx="6858000" cy="9144000"/>
@@ -117,6 +136,761 @@
 </p:presentation>
 </file>
 
+<file path=ppt/notesMasters/notesMaster1.xml><?xml version="1.0" encoding="utf-8"?>
+<p:notesMaster xmlns:a="http://schemas.openxmlformats.org/drawingml/2006/main" xmlns:r="http://schemas.openxmlformats.org/officeDocument/2006/relationships" xmlns:p="http://schemas.openxmlformats.org/presentationml/2006/main">
+  <p:cSld>
+    <p:bg>
+      <p:bgRef idx="1001">
+        <a:schemeClr val="bg1"/>
+      </p:bgRef>
+    </p:bg>
+    <p:spTree>
+      <p:nvGrpSpPr>
+        <p:cNvPr id="1" name=""/>
+        <p:cNvGrpSpPr/>
+        <p:nvPr/>
+      </p:nvGrpSpPr>
+      <p:grpSpPr>
+        <a:xfrm>
+          <a:off x="0" y="0"/>
+          <a:ext cx="0" cy="0"/>
+          <a:chOff x="0" y="0"/>
+          <a:chExt cx="0" cy="0"/>
+        </a:xfrm>
+      </p:grpSpPr>
+      <p:sp>
+        <p:nvSpPr>
+          <p:cNvPr id="2" name="页眉占位符 1"/>
+          <p:cNvSpPr>
+            <a:spLocks noGrp="1"/>
+          </p:cNvSpPr>
+          <p:nvPr>
+            <p:ph type="hdr" sz="quarter"/>
+          </p:nvPr>
+        </p:nvSpPr>
+        <p:spPr>
+          <a:xfrm>
+            <a:off x="0" y="0"/>
+            <a:ext cx="2971800" cy="458788"/>
+          </a:xfrm>
+          <a:prstGeom prst="rect">
+            <a:avLst/>
+          </a:prstGeom>
+        </p:spPr>
+        <p:txBody>
+          <a:bodyPr vert="horz" lIns="91440" tIns="45720" rIns="91440" bIns="45720" rtlCol="0"/>
+          <a:lstStyle>
+            <a:lvl1pPr algn="l">
+              <a:defRPr sz="1200"/>
+            </a:lvl1pPr>
+          </a:lstStyle>
+          <a:p>
+            <a:endParaRPr lang="zh-CN" altLang="en-US"/>
+          </a:p>
+        </p:txBody>
+      </p:sp>
+      <p:sp>
+        <p:nvSpPr>
+          <p:cNvPr id="3" name="日期占位符 2"/>
+          <p:cNvSpPr>
+            <a:spLocks noGrp="1"/>
+          </p:cNvSpPr>
+          <p:nvPr>
+            <p:ph type="dt" idx="1"/>
+          </p:nvPr>
+        </p:nvSpPr>
+        <p:spPr>
+          <a:xfrm>
+            <a:off x="3884613" y="0"/>
+            <a:ext cx="2971800" cy="458788"/>
+          </a:xfrm>
+          <a:prstGeom prst="rect">
+            <a:avLst/>
+          </a:prstGeom>
+        </p:spPr>
+        <p:txBody>
+          <a:bodyPr vert="horz" lIns="91440" tIns="45720" rIns="91440" bIns="45720" rtlCol="0"/>
+          <a:lstStyle>
+            <a:lvl1pPr algn="r">
+              <a:defRPr sz="1200"/>
+            </a:lvl1pPr>
+          </a:lstStyle>
+          <a:p>
+            <a:fld id="{C4659A4D-95A2-422A-88FE-34A8665453CC}" type="datetimeFigureOut">
+              <a:rPr lang="zh-CN" altLang="en-US" smtClean="0"/>
+              <a:t>2019/6/4</a:t>
+            </a:fld>
+            <a:endParaRPr lang="zh-CN" altLang="en-US"/>
+          </a:p>
+        </p:txBody>
+      </p:sp>
+      <p:sp>
+        <p:nvSpPr>
+          <p:cNvPr id="4" name="幻灯片图像占位符 3"/>
+          <p:cNvSpPr>
+            <a:spLocks noGrp="1" noRot="1" noChangeAspect="1"/>
+          </p:cNvSpPr>
+          <p:nvPr>
+            <p:ph type="sldImg" idx="2"/>
+          </p:nvPr>
+        </p:nvSpPr>
+        <p:spPr>
+          <a:xfrm>
+            <a:off x="685800" y="1143000"/>
+            <a:ext cx="5486400" cy="3086100"/>
+          </a:xfrm>
+          <a:prstGeom prst="rect">
+            <a:avLst/>
+          </a:prstGeom>
+          <a:noFill/>
+          <a:ln w="12700">
+            <a:solidFill>
+              <a:prstClr val="black"/>
+            </a:solidFill>
+          </a:ln>
+        </p:spPr>
+        <p:txBody>
+          <a:bodyPr vert="horz" lIns="91440" tIns="45720" rIns="91440" bIns="45720" rtlCol="0" anchor="ctr"/>
+          <a:lstStyle/>
+          <a:p>
+            <a:endParaRPr lang="zh-CN" altLang="en-US"/>
+          </a:p>
+        </p:txBody>
+      </p:sp>
+      <p:sp>
+        <p:nvSpPr>
+          <p:cNvPr id="5" name="备注占位符 4"/>
+          <p:cNvSpPr>
+            <a:spLocks noGrp="1"/>
+          </p:cNvSpPr>
+          <p:nvPr>
+            <p:ph type="body" sz="quarter" idx="3"/>
+          </p:nvPr>
+        </p:nvSpPr>
+        <p:spPr>
+          <a:xfrm>
+            <a:off x="685800" y="4400550"/>
+            <a:ext cx="5486400" cy="3600450"/>
+          </a:xfrm>
+          <a:prstGeom prst="rect">
+            <a:avLst/>
+          </a:prstGeom>
+        </p:spPr>
+        <p:txBody>
+          <a:bodyPr vert="horz" lIns="91440" tIns="45720" rIns="91440" bIns="45720" rtlCol="0"/>
+          <a:lstStyle/>
+          <a:p>
+            <a:pPr lvl="0"/>
+            <a:r>
+              <a:rPr lang="zh-CN" altLang="en-US"/>
+              <a:t>单击此处编辑母版文本样式</a:t>
+            </a:r>
+          </a:p>
+          <a:p>
+            <a:pPr lvl="1"/>
+            <a:r>
+              <a:rPr lang="zh-CN" altLang="en-US"/>
+              <a:t>二级</a:t>
+            </a:r>
+          </a:p>
+          <a:p>
+            <a:pPr lvl="2"/>
+            <a:r>
+              <a:rPr lang="zh-CN" altLang="en-US"/>
+              <a:t>三级</a:t>
+            </a:r>
+          </a:p>
+          <a:p>
+            <a:pPr lvl="3"/>
+            <a:r>
+              <a:rPr lang="zh-CN" altLang="en-US"/>
+              <a:t>四级</a:t>
+            </a:r>
+          </a:p>
+          <a:p>
+            <a:pPr lvl="4"/>
+            <a:r>
+              <a:rPr lang="zh-CN" altLang="en-US"/>
+              <a:t>五级</a:t>
+            </a:r>
+          </a:p>
+        </p:txBody>
+      </p:sp>
+      <p:sp>
+        <p:nvSpPr>
+          <p:cNvPr id="6" name="页脚占位符 5"/>
+          <p:cNvSpPr>
+            <a:spLocks noGrp="1"/>
+          </p:cNvSpPr>
+          <p:nvPr>
+            <p:ph type="ftr" sz="quarter" idx="4"/>
+          </p:nvPr>
+        </p:nvSpPr>
+        <p:spPr>
+          <a:xfrm>
+            <a:off x="0" y="8685213"/>
+            <a:ext cx="2971800" cy="458787"/>
+          </a:xfrm>
+          <a:prstGeom prst="rect">
+            <a:avLst/>
+          </a:prstGeom>
+        </p:spPr>
+        <p:txBody>
+          <a:bodyPr vert="horz" lIns="91440" tIns="45720" rIns="91440" bIns="45720" rtlCol="0" anchor="b"/>
+          <a:lstStyle>
+            <a:lvl1pPr algn="l">
+              <a:defRPr sz="1200"/>
+            </a:lvl1pPr>
+          </a:lstStyle>
+          <a:p>
+            <a:endParaRPr lang="zh-CN" altLang="en-US"/>
+          </a:p>
+        </p:txBody>
+      </p:sp>
+      <p:sp>
+        <p:nvSpPr>
+          <p:cNvPr id="7" name="灯片编号占位符 6"/>
+          <p:cNvSpPr>
+            <a:spLocks noGrp="1"/>
+          </p:cNvSpPr>
+          <p:nvPr>
+            <p:ph type="sldNum" sz="quarter" idx="5"/>
+          </p:nvPr>
+        </p:nvSpPr>
+        <p:spPr>
+          <a:xfrm>
+            <a:off x="3884613" y="8685213"/>
+            <a:ext cx="2971800" cy="458787"/>
+          </a:xfrm>
+          <a:prstGeom prst="rect">
+            <a:avLst/>
+          </a:prstGeom>
+        </p:spPr>
+        <p:txBody>
+          <a:bodyPr vert="horz" lIns="91440" tIns="45720" rIns="91440" bIns="45720" rtlCol="0" anchor="b"/>
+          <a:lstStyle>
+            <a:lvl1pPr algn="r">
+              <a:defRPr sz="1200"/>
+            </a:lvl1pPr>
+          </a:lstStyle>
+          <a:p>
+            <a:fld id="{1C841AC6-D51C-4477-815E-991D57FA81B5}" type="slidenum">
+              <a:rPr lang="zh-CN" altLang="en-US" smtClean="0"/>
+              <a:t>‹#›</a:t>
+            </a:fld>
+            <a:endParaRPr lang="zh-CN" altLang="en-US"/>
+          </a:p>
+        </p:txBody>
+      </p:sp>
+    </p:spTree>
+    <p:extLst>
+      <p:ext uri="{BB962C8B-B14F-4D97-AF65-F5344CB8AC3E}">
+        <p14:creationId xmlns:p14="http://schemas.microsoft.com/office/powerpoint/2010/main" val="2015716207"/>
+      </p:ext>
+    </p:extLst>
+  </p:cSld>
+  <p:clrMap bg1="lt1" tx1="dk1" bg2="lt2" tx2="dk2" accent1="accent1" accent2="accent2" accent3="accent3" accent4="accent4" accent5="accent5" accent6="accent6" hlink="hlink" folHlink="folHlink"/>
+  <p:notesStyle>
+    <a:lvl1pPr marL="0" algn="l" defTabSz="914400" rtl="0" eaLnBrk="1" latinLnBrk="0" hangingPunct="1">
+      <a:defRPr sz="1200" kern="1200">
+        <a:solidFill>
+          <a:schemeClr val="tx1"/>
+        </a:solidFill>
+        <a:latin typeface="+mn-lt"/>
+        <a:ea typeface="+mn-ea"/>
+        <a:cs typeface="+mn-cs"/>
+      </a:defRPr>
+    </a:lvl1pPr>
+    <a:lvl2pPr marL="457200" algn="l" defTabSz="914400" rtl="0" eaLnBrk="1" latinLnBrk="0" hangingPunct="1">
+      <a:defRPr sz="1200" kern="1200">
+        <a:solidFill>
+          <a:schemeClr val="tx1"/>
+        </a:solidFill>
+        <a:latin typeface="+mn-lt"/>
+        <a:ea typeface="+mn-ea"/>
+        <a:cs typeface="+mn-cs"/>
+      </a:defRPr>
+    </a:lvl2pPr>
+    <a:lvl3pPr marL="914400" algn="l" defTabSz="914400" rtl="0" eaLnBrk="1" latinLnBrk="0" hangingPunct="1">
+      <a:defRPr sz="1200" kern="1200">
+        <a:solidFill>
+          <a:schemeClr val="tx1"/>
+        </a:solidFill>
+        <a:latin typeface="+mn-lt"/>
+        <a:ea typeface="+mn-ea"/>
+        <a:cs typeface="+mn-cs"/>
+      </a:defRPr>
+    </a:lvl3pPr>
+    <a:lvl4pPr marL="1371600" algn="l" defTabSz="914400" rtl="0" eaLnBrk="1" latinLnBrk="0" hangingPunct="1">
+      <a:defRPr sz="1200" kern="1200">
+        <a:solidFill>
+          <a:schemeClr val="tx1"/>
+        </a:solidFill>
+        <a:latin typeface="+mn-lt"/>
+        <a:ea typeface="+mn-ea"/>
+        <a:cs typeface="+mn-cs"/>
+      </a:defRPr>
+    </a:lvl4pPr>
+    <a:lvl5pPr marL="1828800" algn="l" defTabSz="914400" rtl="0" eaLnBrk="1" latinLnBrk="0" hangingPunct="1">
+      <a:defRPr sz="1200" kern="1200">
+        <a:solidFill>
+          <a:schemeClr val="tx1"/>
+        </a:solidFill>
+        <a:latin typeface="+mn-lt"/>
+        <a:ea typeface="+mn-ea"/>
+        <a:cs typeface="+mn-cs"/>
+      </a:defRPr>
+    </a:lvl5pPr>
+    <a:lvl6pPr marL="2286000" algn="l" defTabSz="914400" rtl="0" eaLnBrk="1" latinLnBrk="0" hangingPunct="1">
+      <a:defRPr sz="1200" kern="1200">
+        <a:solidFill>
+          <a:schemeClr val="tx1"/>
+        </a:solidFill>
+        <a:latin typeface="+mn-lt"/>
+        <a:ea typeface="+mn-ea"/>
+        <a:cs typeface="+mn-cs"/>
+      </a:defRPr>
+    </a:lvl6pPr>
+    <a:lvl7pPr marL="2743200" algn="l" defTabSz="914400" rtl="0" eaLnBrk="1" latinLnBrk="0" hangingPunct="1">
+      <a:defRPr sz="1200" kern="1200">
+        <a:solidFill>
+          <a:schemeClr val="tx1"/>
+        </a:solidFill>
+        <a:latin typeface="+mn-lt"/>
+        <a:ea typeface="+mn-ea"/>
+        <a:cs typeface="+mn-cs"/>
+      </a:defRPr>
+    </a:lvl7pPr>
+    <a:lvl8pPr marL="3200400" algn="l" defTabSz="914400" rtl="0" eaLnBrk="1" latinLnBrk="0" hangingPunct="1">
+      <a:defRPr sz="1200" kern="1200">
+        <a:solidFill>
+          <a:schemeClr val="tx1"/>
+        </a:solidFill>
+        <a:latin typeface="+mn-lt"/>
+        <a:ea typeface="+mn-ea"/>
+        <a:cs typeface="+mn-cs"/>
+      </a:defRPr>
+    </a:lvl8pPr>
+    <a:lvl9pPr marL="3657600" algn="l" defTabSz="914400" rtl="0" eaLnBrk="1" latinLnBrk="0" hangingPunct="1">
+      <a:defRPr sz="1200" kern="1200">
+        <a:solidFill>
+          <a:schemeClr val="tx1"/>
+        </a:solidFill>
+        <a:latin typeface="+mn-lt"/>
+        <a:ea typeface="+mn-ea"/>
+        <a:cs typeface="+mn-cs"/>
+      </a:defRPr>
+    </a:lvl9pPr>
+  </p:notesStyle>
+</p:notesMaster>
+</file>
+
+<file path=ppt/notesSlides/notesSlide1.xml><?xml version="1.0" encoding="utf-8"?>
+<p:notes xmlns:a="http://schemas.openxmlformats.org/drawingml/2006/main" xmlns:r="http://schemas.openxmlformats.org/officeDocument/2006/relationships" xmlns:p="http://schemas.openxmlformats.org/presentationml/2006/main">
+  <p:cSld>
+    <p:spTree>
+      <p:nvGrpSpPr>
+        <p:cNvPr id="1" name=""/>
+        <p:cNvGrpSpPr/>
+        <p:nvPr/>
+      </p:nvGrpSpPr>
+      <p:grpSpPr>
+        <a:xfrm>
+          <a:off x="0" y="0"/>
+          <a:ext cx="0" cy="0"/>
+          <a:chOff x="0" y="0"/>
+          <a:chExt cx="0" cy="0"/>
+        </a:xfrm>
+      </p:grpSpPr>
+      <p:sp>
+        <p:nvSpPr>
+          <p:cNvPr id="2" name="幻灯片图像占位符 1"/>
+          <p:cNvSpPr>
+            <a:spLocks noGrp="1" noRot="1" noChangeAspect="1"/>
+          </p:cNvSpPr>
+          <p:nvPr>
+            <p:ph type="sldImg"/>
+          </p:nvPr>
+        </p:nvSpPr>
+        <p:spPr/>
+      </p:sp>
+      <p:sp>
+        <p:nvSpPr>
+          <p:cNvPr id="3" name="备注占位符 2"/>
+          <p:cNvSpPr>
+            <a:spLocks noGrp="1"/>
+          </p:cNvSpPr>
+          <p:nvPr>
+            <p:ph type="body" idx="1"/>
+          </p:nvPr>
+        </p:nvSpPr>
+        <p:spPr/>
+        <p:txBody>
+          <a:bodyPr/>
+          <a:lstStyle/>
+          <a:p>
+            <a:r>
+              <a:rPr lang="zh-CN" altLang="en-US" dirty="0"/>
+              <a:t>这个有点儿旧了，</a:t>
+            </a:r>
+            <a:r>
+              <a:rPr lang="en-US" altLang="zh-CN" dirty="0"/>
+              <a:t>17</a:t>
+            </a:r>
+            <a:r>
+              <a:rPr lang="zh-CN" altLang="en-US" dirty="0"/>
+              <a:t>年之前的</a:t>
+            </a:r>
+          </a:p>
+        </p:txBody>
+      </p:sp>
+      <p:sp>
+        <p:nvSpPr>
+          <p:cNvPr id="4" name="灯片编号占位符 3"/>
+          <p:cNvSpPr>
+            <a:spLocks noGrp="1"/>
+          </p:cNvSpPr>
+          <p:nvPr>
+            <p:ph type="sldNum" sz="quarter" idx="5"/>
+          </p:nvPr>
+        </p:nvSpPr>
+        <p:spPr/>
+        <p:txBody>
+          <a:bodyPr/>
+          <a:lstStyle/>
+          <a:p>
+            <a:fld id="{1C841AC6-D51C-4477-815E-991D57FA81B5}" type="slidenum">
+              <a:rPr lang="zh-CN" altLang="en-US" smtClean="0"/>
+              <a:t>3</a:t>
+            </a:fld>
+            <a:endParaRPr lang="zh-CN" altLang="en-US"/>
+          </a:p>
+        </p:txBody>
+      </p:sp>
+    </p:spTree>
+    <p:extLst>
+      <p:ext uri="{BB962C8B-B14F-4D97-AF65-F5344CB8AC3E}">
+        <p14:creationId xmlns:p14="http://schemas.microsoft.com/office/powerpoint/2010/main" val="1943233687"/>
+      </p:ext>
+    </p:extLst>
+  </p:cSld>
+  <p:clrMapOvr>
+    <a:masterClrMapping/>
+  </p:clrMapOvr>
+</p:notes>
+</file>
+
+<file path=ppt/notesSlides/notesSlide2.xml><?xml version="1.0" encoding="utf-8"?>
+<p:notes xmlns:a="http://schemas.openxmlformats.org/drawingml/2006/main" xmlns:r="http://schemas.openxmlformats.org/officeDocument/2006/relationships" xmlns:p="http://schemas.openxmlformats.org/presentationml/2006/main">
+  <p:cSld>
+    <p:spTree>
+      <p:nvGrpSpPr>
+        <p:cNvPr id="1" name=""/>
+        <p:cNvGrpSpPr/>
+        <p:nvPr/>
+      </p:nvGrpSpPr>
+      <p:grpSpPr>
+        <a:xfrm>
+          <a:off x="0" y="0"/>
+          <a:ext cx="0" cy="0"/>
+          <a:chOff x="0" y="0"/>
+          <a:chExt cx="0" cy="0"/>
+        </a:xfrm>
+      </p:grpSpPr>
+      <p:sp>
+        <p:nvSpPr>
+          <p:cNvPr id="2" name="幻灯片图像占位符 1"/>
+          <p:cNvSpPr>
+            <a:spLocks noGrp="1" noRot="1" noChangeAspect="1"/>
+          </p:cNvSpPr>
+          <p:nvPr>
+            <p:ph type="sldImg"/>
+          </p:nvPr>
+        </p:nvSpPr>
+        <p:spPr/>
+      </p:sp>
+      <p:sp>
+        <p:nvSpPr>
+          <p:cNvPr id="3" name="备注占位符 2"/>
+          <p:cNvSpPr>
+            <a:spLocks noGrp="1"/>
+          </p:cNvSpPr>
+          <p:nvPr>
+            <p:ph type="body" idx="1"/>
+          </p:nvPr>
+        </p:nvSpPr>
+        <p:spPr/>
+        <p:txBody>
+          <a:bodyPr/>
+          <a:lstStyle/>
+          <a:p>
+            <a:r>
+              <a:rPr lang="en-US" altLang="zh-CN" dirty="0"/>
+              <a:t>A model is an agent’s representation of the environment, including the transition model and the reward model.</a:t>
+            </a:r>
+          </a:p>
+          <a:p>
+            <a:r>
+              <a:rPr lang="zh-CN" altLang="en-US" dirty="0"/>
+              <a:t>其实</a:t>
+            </a:r>
+            <a:r>
+              <a:rPr lang="en-US" altLang="zh-CN" dirty="0"/>
+              <a:t>model based</a:t>
+            </a:r>
+            <a:r>
+              <a:rPr lang="zh-CN" altLang="en-US" dirty="0"/>
+              <a:t>中有两部分，很多人都忽略了第二部分（</a:t>
+            </a:r>
+            <a:r>
+              <a:rPr lang="en-US" altLang="zh-CN" dirty="0"/>
+              <a:t>reward</a:t>
+            </a:r>
+            <a:r>
+              <a:rPr lang="zh-CN" altLang="en-US" dirty="0"/>
+              <a:t>的建模），或者说把这部分单独去做了。</a:t>
+            </a:r>
+          </a:p>
+        </p:txBody>
+      </p:sp>
+      <p:sp>
+        <p:nvSpPr>
+          <p:cNvPr id="4" name="灯片编号占位符 3"/>
+          <p:cNvSpPr>
+            <a:spLocks noGrp="1"/>
+          </p:cNvSpPr>
+          <p:nvPr>
+            <p:ph type="sldNum" sz="quarter" idx="5"/>
+          </p:nvPr>
+        </p:nvSpPr>
+        <p:spPr/>
+        <p:txBody>
+          <a:bodyPr/>
+          <a:lstStyle/>
+          <a:p>
+            <a:fld id="{1C841AC6-D51C-4477-815E-991D57FA81B5}" type="slidenum">
+              <a:rPr lang="zh-CN" altLang="en-US" smtClean="0"/>
+              <a:t>9</a:t>
+            </a:fld>
+            <a:endParaRPr lang="zh-CN" altLang="en-US"/>
+          </a:p>
+        </p:txBody>
+      </p:sp>
+    </p:spTree>
+    <p:extLst>
+      <p:ext uri="{BB962C8B-B14F-4D97-AF65-F5344CB8AC3E}">
+        <p14:creationId xmlns:p14="http://schemas.microsoft.com/office/powerpoint/2010/main" val="1457989055"/>
+      </p:ext>
+    </p:extLst>
+  </p:cSld>
+  <p:clrMapOvr>
+    <a:masterClrMapping/>
+  </p:clrMapOvr>
+</p:notes>
+</file>
+
+<file path=ppt/notesSlides/notesSlide3.xml><?xml version="1.0" encoding="utf-8"?>
+<p:notes xmlns:a="http://schemas.openxmlformats.org/drawingml/2006/main" xmlns:r="http://schemas.openxmlformats.org/officeDocument/2006/relationships" xmlns:p="http://schemas.openxmlformats.org/presentationml/2006/main">
+  <p:cSld>
+    <p:spTree>
+      <p:nvGrpSpPr>
+        <p:cNvPr id="1" name=""/>
+        <p:cNvGrpSpPr/>
+        <p:nvPr/>
+      </p:nvGrpSpPr>
+      <p:grpSpPr>
+        <a:xfrm>
+          <a:off x="0" y="0"/>
+          <a:ext cx="0" cy="0"/>
+          <a:chOff x="0" y="0"/>
+          <a:chExt cx="0" cy="0"/>
+        </a:xfrm>
+      </p:grpSpPr>
+      <p:sp>
+        <p:nvSpPr>
+          <p:cNvPr id="2" name="幻灯片图像占位符 1"/>
+          <p:cNvSpPr>
+            <a:spLocks noGrp="1" noRot="1" noChangeAspect="1"/>
+          </p:cNvSpPr>
+          <p:nvPr>
+            <p:ph type="sldImg"/>
+          </p:nvPr>
+        </p:nvSpPr>
+        <p:spPr/>
+      </p:sp>
+      <p:sp>
+        <p:nvSpPr>
+          <p:cNvPr id="3" name="备注占位符 2"/>
+          <p:cNvSpPr>
+            <a:spLocks noGrp="1"/>
+          </p:cNvSpPr>
+          <p:nvPr>
+            <p:ph type="body" idx="1"/>
+          </p:nvPr>
+        </p:nvSpPr>
+        <p:spPr/>
+        <p:txBody>
+          <a:bodyPr/>
+          <a:lstStyle/>
+          <a:p>
+            <a:r>
+              <a:rPr lang="en-US" altLang="zh-CN" dirty="0"/>
+              <a:t>Planning </a:t>
+            </a:r>
+            <a:r>
+              <a:rPr lang="zh-CN" altLang="en-US" dirty="0"/>
+              <a:t>通常是在</a:t>
+            </a:r>
+            <a:r>
+              <a:rPr lang="en-US" altLang="zh-CN" dirty="0"/>
+              <a:t>model based</a:t>
+            </a:r>
+            <a:r>
+              <a:rPr lang="zh-CN" altLang="en-US" dirty="0"/>
+              <a:t>的基础上做出预测规划</a:t>
+            </a:r>
+          </a:p>
+        </p:txBody>
+      </p:sp>
+      <p:sp>
+        <p:nvSpPr>
+          <p:cNvPr id="4" name="灯片编号占位符 3"/>
+          <p:cNvSpPr>
+            <a:spLocks noGrp="1"/>
+          </p:cNvSpPr>
+          <p:nvPr>
+            <p:ph type="sldNum" sz="quarter" idx="5"/>
+          </p:nvPr>
+        </p:nvSpPr>
+        <p:spPr/>
+        <p:txBody>
+          <a:bodyPr/>
+          <a:lstStyle/>
+          <a:p>
+            <a:fld id="{1C841AC6-D51C-4477-815E-991D57FA81B5}" type="slidenum">
+              <a:rPr lang="zh-CN" altLang="en-US" smtClean="0"/>
+              <a:t>10</a:t>
+            </a:fld>
+            <a:endParaRPr lang="zh-CN" altLang="en-US"/>
+          </a:p>
+        </p:txBody>
+      </p:sp>
+    </p:spTree>
+    <p:extLst>
+      <p:ext uri="{BB962C8B-B14F-4D97-AF65-F5344CB8AC3E}">
+        <p14:creationId xmlns:p14="http://schemas.microsoft.com/office/powerpoint/2010/main" val="1580476369"/>
+      </p:ext>
+    </p:extLst>
+  </p:cSld>
+  <p:clrMapOvr>
+    <a:masterClrMapping/>
+  </p:clrMapOvr>
+</p:notes>
+</file>
+
+<file path=ppt/notesSlides/notesSlide4.xml><?xml version="1.0" encoding="utf-8"?>
+<p:notes xmlns:a="http://schemas.openxmlformats.org/drawingml/2006/main" xmlns:r="http://schemas.openxmlformats.org/officeDocument/2006/relationships" xmlns:p="http://schemas.openxmlformats.org/presentationml/2006/main">
+  <p:cSld>
+    <p:spTree>
+      <p:nvGrpSpPr>
+        <p:cNvPr id="1" name=""/>
+        <p:cNvGrpSpPr/>
+        <p:nvPr/>
+      </p:nvGrpSpPr>
+      <p:grpSpPr>
+        <a:xfrm>
+          <a:off x="0" y="0"/>
+          <a:ext cx="0" cy="0"/>
+          <a:chOff x="0" y="0"/>
+          <a:chExt cx="0" cy="0"/>
+        </a:xfrm>
+      </p:grpSpPr>
+      <p:sp>
+        <p:nvSpPr>
+          <p:cNvPr id="2" name="幻灯片图像占位符 1"/>
+          <p:cNvSpPr>
+            <a:spLocks noGrp="1" noRot="1" noChangeAspect="1"/>
+          </p:cNvSpPr>
+          <p:nvPr>
+            <p:ph type="sldImg"/>
+          </p:nvPr>
+        </p:nvSpPr>
+        <p:spPr/>
+      </p:sp>
+      <p:sp>
+        <p:nvSpPr>
+          <p:cNvPr id="3" name="备注占位符 2"/>
+          <p:cNvSpPr>
+            <a:spLocks noGrp="1"/>
+          </p:cNvSpPr>
+          <p:nvPr>
+            <p:ph type="body" idx="1"/>
+          </p:nvPr>
+        </p:nvSpPr>
+        <p:spPr/>
+        <p:txBody>
+          <a:bodyPr/>
+          <a:lstStyle/>
+          <a:p>
+            <a:r>
+              <a:rPr lang="zh-CN" altLang="en-US" dirty="0"/>
+              <a:t>这里把</a:t>
+            </a:r>
+            <a:r>
+              <a:rPr lang="en-US" altLang="zh-CN" dirty="0"/>
+              <a:t>attention</a:t>
+            </a:r>
+            <a:r>
+              <a:rPr lang="zh-CN" altLang="en-US" dirty="0"/>
+              <a:t>看作是对</a:t>
+            </a:r>
+            <a:r>
+              <a:rPr lang="en-US" altLang="zh-CN" dirty="0"/>
+              <a:t>memory</a:t>
+            </a:r>
+            <a:r>
+              <a:rPr lang="zh-CN" altLang="en-US" dirty="0"/>
+              <a:t>抽象和约简的机制。个人认为约简有，但抽象好像并没有做到</a:t>
+            </a:r>
+          </a:p>
+        </p:txBody>
+      </p:sp>
+      <p:sp>
+        <p:nvSpPr>
+          <p:cNvPr id="4" name="灯片编号占位符 3"/>
+          <p:cNvSpPr>
+            <a:spLocks noGrp="1"/>
+          </p:cNvSpPr>
+          <p:nvPr>
+            <p:ph type="sldNum" sz="quarter" idx="5"/>
+          </p:nvPr>
+        </p:nvSpPr>
+        <p:spPr/>
+        <p:txBody>
+          <a:bodyPr/>
+          <a:lstStyle/>
+          <a:p>
+            <a:fld id="{1C841AC6-D51C-4477-815E-991D57FA81B5}" type="slidenum">
+              <a:rPr lang="zh-CN" altLang="en-US" smtClean="0"/>
+              <a:t>12</a:t>
+            </a:fld>
+            <a:endParaRPr lang="zh-CN" altLang="en-US"/>
+          </a:p>
+        </p:txBody>
+      </p:sp>
+    </p:spTree>
+    <p:extLst>
+      <p:ext uri="{BB962C8B-B14F-4D97-AF65-F5344CB8AC3E}">
+        <p14:creationId xmlns:p14="http://schemas.microsoft.com/office/powerpoint/2010/main" val="4142451072"/>
+      </p:ext>
+    </p:extLst>
+  </p:cSld>
+  <p:clrMapOvr>
+    <a:masterClrMapping/>
+  </p:clrMapOvr>
+</p:notes>
+</file>
+
 <file path=ppt/slideLayouts/slideLayout1.xml><?xml version="1.0" encoding="utf-8"?>
 <p:sldLayout xmlns:a="http://schemas.openxmlformats.org/drawingml/2006/main" xmlns:r="http://schemas.openxmlformats.org/officeDocument/2006/relationships" xmlns:p="http://schemas.openxmlformats.org/presentationml/2006/main" type="title" preserve="1">
   <p:cSld name="标题幻灯片">
@@ -264,7 +1038,7 @@
           <a:p>
             <a:fld id="{9280A58A-AFA5-43FB-91A3-52FE65141026}" type="datetimeFigureOut">
               <a:rPr lang="zh-CN" altLang="en-US" smtClean="0"/>
-              <a:t>2019/5/31</a:t>
+              <a:t>2019/6/4</a:t>
             </a:fld>
             <a:endParaRPr lang="zh-CN" altLang="en-US"/>
           </a:p>
@@ -462,7 +1236,7 @@
           <a:p>
             <a:fld id="{9280A58A-AFA5-43FB-91A3-52FE65141026}" type="datetimeFigureOut">
               <a:rPr lang="zh-CN" altLang="en-US" smtClean="0"/>
-              <a:t>2019/5/31</a:t>
+              <a:t>2019/6/4</a:t>
             </a:fld>
             <a:endParaRPr lang="zh-CN" altLang="en-US"/>
           </a:p>
@@ -670,7 +1444,7 @@
           <a:p>
             <a:fld id="{9280A58A-AFA5-43FB-91A3-52FE65141026}" type="datetimeFigureOut">
               <a:rPr lang="zh-CN" altLang="en-US" smtClean="0"/>
-              <a:t>2019/5/31</a:t>
+              <a:t>2019/6/4</a:t>
             </a:fld>
             <a:endParaRPr lang="zh-CN" altLang="en-US"/>
           </a:p>
@@ -868,7 +1642,7 @@
           <a:p>
             <a:fld id="{9280A58A-AFA5-43FB-91A3-52FE65141026}" type="datetimeFigureOut">
               <a:rPr lang="zh-CN" altLang="en-US" smtClean="0"/>
-              <a:t>2019/5/31</a:t>
+              <a:t>2019/6/4</a:t>
             </a:fld>
             <a:endParaRPr lang="zh-CN" altLang="en-US"/>
           </a:p>
@@ -1143,7 +1917,7 @@
           <a:p>
             <a:fld id="{9280A58A-AFA5-43FB-91A3-52FE65141026}" type="datetimeFigureOut">
               <a:rPr lang="zh-CN" altLang="en-US" smtClean="0"/>
-              <a:t>2019/5/31</a:t>
+              <a:t>2019/6/4</a:t>
             </a:fld>
             <a:endParaRPr lang="zh-CN" altLang="en-US"/>
           </a:p>
@@ -1408,7 +2182,7 @@
           <a:p>
             <a:fld id="{9280A58A-AFA5-43FB-91A3-52FE65141026}" type="datetimeFigureOut">
               <a:rPr lang="zh-CN" altLang="en-US" smtClean="0"/>
-              <a:t>2019/5/31</a:t>
+              <a:t>2019/6/4</a:t>
             </a:fld>
             <a:endParaRPr lang="zh-CN" altLang="en-US"/>
           </a:p>
@@ -1820,7 +2594,7 @@
           <a:p>
             <a:fld id="{9280A58A-AFA5-43FB-91A3-52FE65141026}" type="datetimeFigureOut">
               <a:rPr lang="zh-CN" altLang="en-US" smtClean="0"/>
-              <a:t>2019/5/31</a:t>
+              <a:t>2019/6/4</a:t>
             </a:fld>
             <a:endParaRPr lang="zh-CN" altLang="en-US"/>
           </a:p>
@@ -1961,7 +2735,7 @@
           <a:p>
             <a:fld id="{9280A58A-AFA5-43FB-91A3-52FE65141026}" type="datetimeFigureOut">
               <a:rPr lang="zh-CN" altLang="en-US" smtClean="0"/>
-              <a:t>2019/5/31</a:t>
+              <a:t>2019/6/4</a:t>
             </a:fld>
             <a:endParaRPr lang="zh-CN" altLang="en-US"/>
           </a:p>
@@ -2074,7 +2848,7 @@
           <a:p>
             <a:fld id="{9280A58A-AFA5-43FB-91A3-52FE65141026}" type="datetimeFigureOut">
               <a:rPr lang="zh-CN" altLang="en-US" smtClean="0"/>
-              <a:t>2019/5/31</a:t>
+              <a:t>2019/6/4</a:t>
             </a:fld>
             <a:endParaRPr lang="zh-CN" altLang="en-US"/>
           </a:p>
@@ -2385,7 +3159,7 @@
           <a:p>
             <a:fld id="{9280A58A-AFA5-43FB-91A3-52FE65141026}" type="datetimeFigureOut">
               <a:rPr lang="zh-CN" altLang="en-US" smtClean="0"/>
-              <a:t>2019/5/31</a:t>
+              <a:t>2019/6/4</a:t>
             </a:fld>
             <a:endParaRPr lang="zh-CN" altLang="en-US"/>
           </a:p>
@@ -2673,7 +3447,7 @@
           <a:p>
             <a:fld id="{9280A58A-AFA5-43FB-91A3-52FE65141026}" type="datetimeFigureOut">
               <a:rPr lang="zh-CN" altLang="en-US" smtClean="0"/>
-              <a:t>2019/5/31</a:t>
+              <a:t>2019/6/4</a:t>
             </a:fld>
             <a:endParaRPr lang="zh-CN" altLang="en-US"/>
           </a:p>
@@ -2914,7 +3688,7 @@
           <a:p>
             <a:fld id="{9280A58A-AFA5-43FB-91A3-52FE65141026}" type="datetimeFigureOut">
               <a:rPr lang="zh-CN" altLang="en-US" smtClean="0"/>
-              <a:t>2019/5/31</a:t>
+              <a:t>2019/6/4</a:t>
             </a:fld>
             <a:endParaRPr lang="zh-CN" altLang="en-US"/>
           </a:p>
@@ -3401,6 +4175,1396 @@
 </p:sld>
 </file>
 
+<file path=ppt/slides/slide10.xml><?xml version="1.0" encoding="utf-8"?>
+<p:sld xmlns:a="http://schemas.openxmlformats.org/drawingml/2006/main" xmlns:r="http://schemas.openxmlformats.org/officeDocument/2006/relationships" xmlns:p="http://schemas.openxmlformats.org/presentationml/2006/main">
+  <p:cSld>
+    <p:spTree>
+      <p:nvGrpSpPr>
+        <p:cNvPr id="1" name=""/>
+        <p:cNvGrpSpPr/>
+        <p:nvPr/>
+      </p:nvGrpSpPr>
+      <p:grpSpPr>
+        <a:xfrm>
+          <a:off x="0" y="0"/>
+          <a:ext cx="0" cy="0"/>
+          <a:chOff x="0" y="0"/>
+          <a:chExt cx="0" cy="0"/>
+        </a:xfrm>
+      </p:grpSpPr>
+      <p:sp>
+        <p:nvSpPr>
+          <p:cNvPr id="2" name="标题 1">
+            <a:extLst>
+              <a:ext uri="{FF2B5EF4-FFF2-40B4-BE49-F238E27FC236}">
+                <a16:creationId xmlns:a16="http://schemas.microsoft.com/office/drawing/2014/main" id="{B12FA34A-B0E1-4F2B-8B4B-3D3BDF653DC5}"/>
+              </a:ext>
+            </a:extLst>
+          </p:cNvPr>
+          <p:cNvSpPr>
+            <a:spLocks noGrp="1"/>
+          </p:cNvSpPr>
+          <p:nvPr>
+            <p:ph type="title"/>
+          </p:nvPr>
+        </p:nvSpPr>
+        <p:spPr/>
+        <p:txBody>
+          <a:bodyPr>
+            <a:normAutofit/>
+          </a:bodyPr>
+          <a:lstStyle/>
+          <a:p>
+            <a:r>
+              <a:rPr lang="en-US" altLang="zh-CN" dirty="0"/>
+              <a:t>Core Elements- planning</a:t>
+            </a:r>
+            <a:br>
+              <a:rPr lang="en-US" altLang="zh-CN" dirty="0"/>
+            </a:br>
+            <a:r>
+              <a:rPr lang="en-US" altLang="zh-CN" sz="2000" dirty="0"/>
+              <a:t> </a:t>
+            </a:r>
+            <a:r>
+              <a:rPr lang="en-US" altLang="zh-CN" sz="2000" dirty="0" err="1"/>
+              <a:t>planning</a:t>
+            </a:r>
+            <a:r>
+              <a:rPr lang="en-US" altLang="zh-CN" sz="2000" dirty="0"/>
+              <a:t> is usually related to model-based RL methods  </a:t>
+            </a:r>
+            <a:endParaRPr lang="zh-CN" altLang="en-US" dirty="0"/>
+          </a:p>
+        </p:txBody>
+      </p:sp>
+      <p:sp>
+        <p:nvSpPr>
+          <p:cNvPr id="3" name="内容占位符 2">
+            <a:extLst>
+              <a:ext uri="{FF2B5EF4-FFF2-40B4-BE49-F238E27FC236}">
+                <a16:creationId xmlns:a16="http://schemas.microsoft.com/office/drawing/2014/main" id="{197DD283-3824-4912-9869-CBA7A89F5C04}"/>
+              </a:ext>
+            </a:extLst>
+          </p:cNvPr>
+          <p:cNvSpPr>
+            <a:spLocks noGrp="1"/>
+          </p:cNvSpPr>
+          <p:nvPr>
+            <p:ph idx="1"/>
+          </p:nvPr>
+        </p:nvSpPr>
+        <p:spPr/>
+        <p:txBody>
+          <a:bodyPr/>
+          <a:lstStyle/>
+          <a:p>
+            <a:r>
+              <a:rPr lang="en-US" altLang="zh-CN" dirty="0"/>
+              <a:t> Value Iteration Networks (VIN)</a:t>
+            </a:r>
+          </a:p>
+          <a:p>
+            <a:r>
+              <a:rPr lang="en-US" altLang="zh-CN" dirty="0">
+                <a:hlinkClick r:id="rId3"/>
+              </a:rPr>
+              <a:t>https://github.com/karpathy/papernotes/blob/master/vin.md</a:t>
+            </a:r>
+            <a:endParaRPr lang="en-US" altLang="zh-CN" dirty="0"/>
+          </a:p>
+          <a:p>
+            <a:r>
+              <a:rPr lang="en-US" altLang="zh-CN" dirty="0"/>
+              <a:t>classical Dyna-Q (Sutton, 1900)</a:t>
+            </a:r>
+          </a:p>
+          <a:p>
+            <a:r>
+              <a:rPr lang="en-US" altLang="zh-CN" dirty="0"/>
+              <a:t>Silver et al. (2016b)</a:t>
+            </a:r>
+            <a:endParaRPr lang="zh-CN" altLang="en-US" dirty="0"/>
+          </a:p>
+        </p:txBody>
+      </p:sp>
+    </p:spTree>
+    <p:extLst>
+      <p:ext uri="{BB962C8B-B14F-4D97-AF65-F5344CB8AC3E}">
+        <p14:creationId xmlns:p14="http://schemas.microsoft.com/office/powerpoint/2010/main" val="3226479741"/>
+      </p:ext>
+    </p:extLst>
+  </p:cSld>
+  <p:clrMapOvr>
+    <a:masterClrMapping/>
+  </p:clrMapOvr>
+</p:sld>
+</file>
+
+<file path=ppt/slides/slide11.xml><?xml version="1.0" encoding="utf-8"?>
+<p:sld xmlns:a="http://schemas.openxmlformats.org/drawingml/2006/main" xmlns:r="http://schemas.openxmlformats.org/officeDocument/2006/relationships" xmlns:p="http://schemas.openxmlformats.org/presentationml/2006/main">
+  <p:cSld>
+    <p:spTree>
+      <p:nvGrpSpPr>
+        <p:cNvPr id="1" name=""/>
+        <p:cNvGrpSpPr/>
+        <p:nvPr/>
+      </p:nvGrpSpPr>
+      <p:grpSpPr>
+        <a:xfrm>
+          <a:off x="0" y="0"/>
+          <a:ext cx="0" cy="0"/>
+          <a:chOff x="0" y="0"/>
+          <a:chExt cx="0" cy="0"/>
+        </a:xfrm>
+      </p:grpSpPr>
+      <p:sp>
+        <p:nvSpPr>
+          <p:cNvPr id="2" name="标题 1">
+            <a:extLst>
+              <a:ext uri="{FF2B5EF4-FFF2-40B4-BE49-F238E27FC236}">
+                <a16:creationId xmlns:a16="http://schemas.microsoft.com/office/drawing/2014/main" id="{8601DE14-A325-4258-95D6-E7236941031A}"/>
+              </a:ext>
+            </a:extLst>
+          </p:cNvPr>
+          <p:cNvSpPr>
+            <a:spLocks noGrp="1"/>
+          </p:cNvSpPr>
+          <p:nvPr>
+            <p:ph type="title"/>
+          </p:nvPr>
+        </p:nvSpPr>
+        <p:spPr/>
+        <p:txBody>
+          <a:bodyPr/>
+          <a:lstStyle/>
+          <a:p>
+            <a:r>
+              <a:rPr lang="en-US" altLang="zh-CN" dirty="0"/>
+              <a:t>Core Elements- exploration</a:t>
+            </a:r>
+            <a:endParaRPr lang="zh-CN" altLang="en-US" dirty="0"/>
+          </a:p>
+        </p:txBody>
+      </p:sp>
+      <p:sp>
+        <p:nvSpPr>
+          <p:cNvPr id="3" name="内容占位符 2">
+            <a:extLst>
+              <a:ext uri="{FF2B5EF4-FFF2-40B4-BE49-F238E27FC236}">
+                <a16:creationId xmlns:a16="http://schemas.microsoft.com/office/drawing/2014/main" id="{19004446-CC6F-4F95-875E-03FE59381D84}"/>
+              </a:ext>
+            </a:extLst>
+          </p:cNvPr>
+          <p:cNvSpPr>
+            <a:spLocks noGrp="1"/>
+          </p:cNvSpPr>
+          <p:nvPr>
+            <p:ph idx="1"/>
+          </p:nvPr>
+        </p:nvSpPr>
+        <p:spPr/>
+        <p:txBody>
+          <a:bodyPr>
+            <a:normAutofit fontScale="92500" lnSpcReduction="20000"/>
+          </a:bodyPr>
+          <a:lstStyle/>
+          <a:p>
+            <a:r>
+              <a:rPr lang="en-US" altLang="zh-CN" dirty="0"/>
+              <a:t>count-based exploration</a:t>
+            </a:r>
+          </a:p>
+          <a:p>
+            <a:pPr lvl="1"/>
+            <a:r>
+              <a:rPr lang="en-US" altLang="zh-CN" dirty="0"/>
+              <a:t>RL agent uses visit counts to guide its </a:t>
+            </a:r>
+            <a:r>
+              <a:rPr lang="en-US" altLang="zh-CN" dirty="0" err="1"/>
+              <a:t>behaviour</a:t>
+            </a:r>
+            <a:r>
+              <a:rPr lang="en-US" altLang="zh-CN" dirty="0"/>
+              <a:t> to reduce uncertainty</a:t>
+            </a:r>
+          </a:p>
+          <a:p>
+            <a:pPr lvl="1"/>
+            <a:r>
+              <a:rPr lang="en-US" altLang="zh-CN" dirty="0"/>
+              <a:t>Intrinsic motivation methods</a:t>
+            </a:r>
+          </a:p>
+          <a:p>
+            <a:pPr lvl="1"/>
+            <a:r>
+              <a:rPr lang="en-US" altLang="zh-CN" dirty="0" err="1"/>
+              <a:t>Bellemareetal</a:t>
+            </a:r>
+            <a:r>
+              <a:rPr lang="en-US" altLang="zh-CN" dirty="0"/>
+              <a:t>.(2016)proposed pseudo-count</a:t>
+            </a:r>
+          </a:p>
+          <a:p>
+            <a:r>
+              <a:rPr lang="en-US" altLang="zh-CN" dirty="0"/>
+              <a:t>Nachum et al. (2017) proposed an under-appreciated reward exploration technique</a:t>
+            </a:r>
+          </a:p>
+          <a:p>
+            <a:r>
+              <a:rPr lang="en-US" altLang="zh-CN" dirty="0" err="1"/>
+              <a:t>Osband</a:t>
+            </a:r>
+            <a:r>
+              <a:rPr lang="en-US" altLang="zh-CN" dirty="0"/>
+              <a:t> et al. (2016) proposed bootstrapped DQN</a:t>
+            </a:r>
+          </a:p>
+          <a:p>
+            <a:r>
+              <a:rPr lang="fr-FR" altLang="zh-CN" dirty="0"/>
+              <a:t>Fortunato et al. (2017) proposed NoisyNet for efﬁcient exploration</a:t>
+            </a:r>
+          </a:p>
+          <a:p>
+            <a:r>
+              <a:rPr lang="en-US" altLang="zh-CN" dirty="0"/>
+              <a:t>Azar et al. (2017); </a:t>
+            </a:r>
+          </a:p>
+          <a:p>
+            <a:r>
+              <a:rPr lang="en-US" altLang="zh-CN" dirty="0"/>
+              <a:t>Jiang et al. (2016);</a:t>
+            </a:r>
+          </a:p>
+          <a:p>
+            <a:r>
+              <a:rPr lang="en-US" altLang="zh-CN" dirty="0"/>
+              <a:t> </a:t>
+            </a:r>
+            <a:r>
+              <a:rPr lang="en-US" altLang="zh-CN" dirty="0" err="1"/>
+              <a:t>Ostrovski</a:t>
+            </a:r>
+            <a:r>
+              <a:rPr lang="en-US" altLang="zh-CN" dirty="0"/>
+              <a:t> et al. (2017).</a:t>
+            </a:r>
+            <a:endParaRPr lang="zh-CN" altLang="en-US" dirty="0"/>
+          </a:p>
+        </p:txBody>
+      </p:sp>
+    </p:spTree>
+    <p:extLst>
+      <p:ext uri="{BB962C8B-B14F-4D97-AF65-F5344CB8AC3E}">
+        <p14:creationId xmlns:p14="http://schemas.microsoft.com/office/powerpoint/2010/main" val="3906880557"/>
+      </p:ext>
+    </p:extLst>
+  </p:cSld>
+  <p:clrMapOvr>
+    <a:masterClrMapping/>
+  </p:clrMapOvr>
+</p:sld>
+</file>
+
+<file path=ppt/slides/slide12.xml><?xml version="1.0" encoding="utf-8"?>
+<p:sld xmlns:a="http://schemas.openxmlformats.org/drawingml/2006/main" xmlns:r="http://schemas.openxmlformats.org/officeDocument/2006/relationships" xmlns:p="http://schemas.openxmlformats.org/presentationml/2006/main">
+  <p:cSld>
+    <p:spTree>
+      <p:nvGrpSpPr>
+        <p:cNvPr id="1" name=""/>
+        <p:cNvGrpSpPr/>
+        <p:nvPr/>
+      </p:nvGrpSpPr>
+      <p:grpSpPr>
+        <a:xfrm>
+          <a:off x="0" y="0"/>
+          <a:ext cx="0" cy="0"/>
+          <a:chOff x="0" y="0"/>
+          <a:chExt cx="0" cy="0"/>
+        </a:xfrm>
+      </p:grpSpPr>
+      <p:sp>
+        <p:nvSpPr>
+          <p:cNvPr id="2" name="标题 1">
+            <a:extLst>
+              <a:ext uri="{FF2B5EF4-FFF2-40B4-BE49-F238E27FC236}">
+                <a16:creationId xmlns:a16="http://schemas.microsoft.com/office/drawing/2014/main" id="{B8494FDF-6FAD-4596-ACC3-F4DC27401A82}"/>
+              </a:ext>
+            </a:extLst>
+          </p:cNvPr>
+          <p:cNvSpPr>
+            <a:spLocks noGrp="1"/>
+          </p:cNvSpPr>
+          <p:nvPr>
+            <p:ph type="title"/>
+          </p:nvPr>
+        </p:nvSpPr>
+        <p:spPr/>
+        <p:txBody>
+          <a:bodyPr/>
+          <a:lstStyle/>
+          <a:p>
+            <a:r>
+              <a:rPr lang="en-US" altLang="zh-CN" dirty="0"/>
+              <a:t>Important Mechanisms-Attention- Memory</a:t>
+            </a:r>
+            <a:endParaRPr lang="zh-CN" altLang="en-US" dirty="0"/>
+          </a:p>
+        </p:txBody>
+      </p:sp>
+      <p:sp>
+        <p:nvSpPr>
+          <p:cNvPr id="3" name="内容占位符 2">
+            <a:extLst>
+              <a:ext uri="{FF2B5EF4-FFF2-40B4-BE49-F238E27FC236}">
+                <a16:creationId xmlns:a16="http://schemas.microsoft.com/office/drawing/2014/main" id="{3AD141F7-EB8A-4D6A-AAF8-27203AD07A41}"/>
+              </a:ext>
+            </a:extLst>
+          </p:cNvPr>
+          <p:cNvSpPr>
+            <a:spLocks noGrp="1"/>
+          </p:cNvSpPr>
+          <p:nvPr>
+            <p:ph idx="1"/>
+          </p:nvPr>
+        </p:nvSpPr>
+        <p:spPr/>
+        <p:txBody>
+          <a:bodyPr/>
+          <a:lstStyle/>
+          <a:p>
+            <a:r>
+              <a:rPr lang="en-US" altLang="zh-CN" dirty="0"/>
+              <a:t>Attention is a mechanism to focus on the salient parts. Memory provides data storage for long time, and attention is an approach for memory addressing.</a:t>
+            </a:r>
+          </a:p>
+          <a:p>
+            <a:r>
+              <a:rPr lang="en-US" altLang="zh-CN" dirty="0"/>
+              <a:t>Graves et al. (2016) proposed differentiable neural computer (DNC) </a:t>
+            </a:r>
+            <a:r>
+              <a:rPr lang="en-US" altLang="zh-CN" sz="2000" dirty="0">
+                <a:hlinkClick r:id="rId3"/>
+              </a:rPr>
+              <a:t>https://deepmind.com/blog/differentiable-neural-computers/</a:t>
+            </a:r>
+            <a:endParaRPr lang="en-US" altLang="zh-CN" sz="2000" dirty="0"/>
+          </a:p>
+          <a:p>
+            <a:r>
+              <a:rPr lang="en-US" altLang="zh-CN" dirty="0"/>
+              <a:t>Attention in object detection</a:t>
+            </a:r>
+            <a:r>
+              <a:rPr lang="zh-CN" altLang="en-US" dirty="0"/>
+              <a:t>， </a:t>
+            </a:r>
+            <a:r>
+              <a:rPr lang="en-US" altLang="zh-CN" dirty="0"/>
+              <a:t>in image caption </a:t>
+            </a:r>
+            <a:r>
+              <a:rPr lang="zh-CN" altLang="en-US" dirty="0"/>
+              <a:t>， </a:t>
+            </a:r>
+            <a:r>
+              <a:rPr lang="en-US" altLang="zh-CN" dirty="0"/>
+              <a:t>in cv , in </a:t>
+            </a:r>
+            <a:r>
+              <a:rPr lang="en-US" altLang="zh-CN" dirty="0" err="1"/>
+              <a:t>nlp</a:t>
+            </a:r>
+            <a:endParaRPr lang="en-US" altLang="zh-CN" dirty="0"/>
+          </a:p>
+          <a:p>
+            <a:r>
+              <a:rPr lang="en-US" altLang="zh-CN" dirty="0"/>
+              <a:t>Soft attention</a:t>
+            </a:r>
+            <a:endParaRPr lang="zh-CN" altLang="en-US" dirty="0"/>
+          </a:p>
+        </p:txBody>
+      </p:sp>
+    </p:spTree>
+    <p:extLst>
+      <p:ext uri="{BB962C8B-B14F-4D97-AF65-F5344CB8AC3E}">
+        <p14:creationId xmlns:p14="http://schemas.microsoft.com/office/powerpoint/2010/main" val="3705715468"/>
+      </p:ext>
+    </p:extLst>
+  </p:cSld>
+  <p:clrMapOvr>
+    <a:masterClrMapping/>
+  </p:clrMapOvr>
+</p:sld>
+</file>
+
+<file path=ppt/slides/slide13.xml><?xml version="1.0" encoding="utf-8"?>
+<p:sld xmlns:a="http://schemas.openxmlformats.org/drawingml/2006/main" xmlns:r="http://schemas.openxmlformats.org/officeDocument/2006/relationships" xmlns:p="http://schemas.openxmlformats.org/presentationml/2006/main">
+  <p:cSld>
+    <p:spTree>
+      <p:nvGrpSpPr>
+        <p:cNvPr id="1" name=""/>
+        <p:cNvGrpSpPr/>
+        <p:nvPr/>
+      </p:nvGrpSpPr>
+      <p:grpSpPr>
+        <a:xfrm>
+          <a:off x="0" y="0"/>
+          <a:ext cx="0" cy="0"/>
+          <a:chOff x="0" y="0"/>
+          <a:chExt cx="0" cy="0"/>
+        </a:xfrm>
+      </p:grpSpPr>
+      <p:sp>
+        <p:nvSpPr>
+          <p:cNvPr id="2" name="标题 1">
+            <a:extLst>
+              <a:ext uri="{FF2B5EF4-FFF2-40B4-BE49-F238E27FC236}">
+                <a16:creationId xmlns:a16="http://schemas.microsoft.com/office/drawing/2014/main" id="{3748E2E9-D90A-4AFD-B8E2-F901FAB9A52B}"/>
+              </a:ext>
+            </a:extLst>
+          </p:cNvPr>
+          <p:cNvSpPr>
+            <a:spLocks noGrp="1"/>
+          </p:cNvSpPr>
+          <p:nvPr>
+            <p:ph type="title"/>
+          </p:nvPr>
+        </p:nvSpPr>
+        <p:spPr>
+          <a:xfrm>
+            <a:off x="838200" y="365125"/>
+            <a:ext cx="10515600" cy="845837"/>
+          </a:xfrm>
+        </p:spPr>
+        <p:txBody>
+          <a:bodyPr>
+            <a:normAutofit/>
+          </a:bodyPr>
+          <a:lstStyle/>
+          <a:p>
+            <a:r>
+              <a:rPr lang="en-US" altLang="zh-CN" sz="4000" dirty="0"/>
+              <a:t>Important Mechanisms-Unsupervised learning </a:t>
+            </a:r>
+            <a:endParaRPr lang="zh-CN" altLang="en-US" sz="4000" dirty="0"/>
+          </a:p>
+        </p:txBody>
+      </p:sp>
+      <p:sp>
+        <p:nvSpPr>
+          <p:cNvPr id="3" name="内容占位符 2">
+            <a:extLst>
+              <a:ext uri="{FF2B5EF4-FFF2-40B4-BE49-F238E27FC236}">
+                <a16:creationId xmlns:a16="http://schemas.microsoft.com/office/drawing/2014/main" id="{23C0F423-10E6-4F2A-8B99-17EC118AA832}"/>
+              </a:ext>
+            </a:extLst>
+          </p:cNvPr>
+          <p:cNvSpPr>
+            <a:spLocks noGrp="1"/>
+          </p:cNvSpPr>
+          <p:nvPr>
+            <p:ph idx="1"/>
+          </p:nvPr>
+        </p:nvSpPr>
+        <p:spPr>
+          <a:xfrm>
+            <a:off x="838200" y="1297459"/>
+            <a:ext cx="10515600" cy="4879504"/>
+          </a:xfrm>
+        </p:spPr>
+        <p:txBody>
+          <a:bodyPr>
+            <a:normAutofit fontScale="70000" lnSpcReduction="20000"/>
+          </a:bodyPr>
+          <a:lstStyle/>
+          <a:p>
+            <a:r>
+              <a:rPr lang="en-US" altLang="zh-CN" dirty="0"/>
+              <a:t>Unsupervised learning is a way to take advantage of the massive amount of data, and would be acritical mechanism to achieve general artificial intelligence.</a:t>
+            </a:r>
+          </a:p>
+          <a:p>
+            <a:r>
+              <a:rPr lang="en-US" altLang="zh-CN" dirty="0"/>
+              <a:t>Probabilistic models :</a:t>
+            </a:r>
+          </a:p>
+          <a:p>
+            <a:pPr lvl="1"/>
+            <a:r>
+              <a:rPr lang="en-US" altLang="zh-CN" dirty="0"/>
+              <a:t>With explicit density functions</a:t>
+            </a:r>
+          </a:p>
+          <a:p>
+            <a:pPr lvl="2"/>
+            <a:r>
+              <a:rPr lang="en-US" altLang="zh-CN" dirty="0"/>
+              <a:t>Tractable models : fully observable belief nets, neural autoregressive distribution estimators , </a:t>
+            </a:r>
+            <a:r>
+              <a:rPr lang="en-US" altLang="zh-CN" dirty="0" err="1"/>
+              <a:t>PixelRNN</a:t>
+            </a:r>
+            <a:r>
+              <a:rPr lang="en-US" altLang="zh-CN" dirty="0"/>
+              <a:t>;</a:t>
+            </a:r>
+          </a:p>
+          <a:p>
+            <a:pPr lvl="2"/>
+            <a:r>
+              <a:rPr lang="en-US" altLang="zh-CN" dirty="0"/>
+              <a:t>Non-tractable models : </a:t>
+            </a:r>
+            <a:r>
+              <a:rPr lang="en-US" altLang="zh-CN" dirty="0" err="1"/>
+              <a:t>Botlzmann</a:t>
+            </a:r>
+            <a:r>
+              <a:rPr lang="en-US" altLang="zh-CN" dirty="0"/>
+              <a:t> machines , VAE, </a:t>
+            </a:r>
+            <a:r>
+              <a:rPr lang="en-US" altLang="zh-CN" dirty="0" err="1"/>
+              <a:t>Helmhotz</a:t>
+            </a:r>
+            <a:r>
+              <a:rPr lang="en-US" altLang="zh-CN" dirty="0"/>
+              <a:t> machines</a:t>
+            </a:r>
+          </a:p>
+          <a:p>
+            <a:pPr lvl="1"/>
+            <a:r>
+              <a:rPr lang="en-US" altLang="zh-CN" dirty="0"/>
+              <a:t>With implicit density functions</a:t>
+            </a:r>
+          </a:p>
+          <a:p>
+            <a:pPr lvl="2"/>
+            <a:r>
+              <a:rPr lang="en-US" altLang="zh-CN" dirty="0"/>
+              <a:t>GAN</a:t>
+            </a:r>
+          </a:p>
+          <a:p>
+            <a:pPr lvl="2"/>
+            <a:r>
+              <a:rPr lang="en-US" altLang="zh-CN" dirty="0"/>
+              <a:t>Moment matching networks</a:t>
+            </a:r>
+          </a:p>
+          <a:p>
+            <a:r>
+              <a:rPr lang="en-US" altLang="zh-CN" dirty="0"/>
+              <a:t>Non-probabilistic models,</a:t>
+            </a:r>
+          </a:p>
+          <a:p>
+            <a:pPr lvl="1"/>
+            <a:r>
+              <a:rPr lang="en-US" altLang="zh-CN" dirty="0"/>
+              <a:t>Sparse coding </a:t>
+            </a:r>
+          </a:p>
+          <a:p>
+            <a:pPr lvl="1"/>
+            <a:r>
+              <a:rPr lang="en-US" altLang="zh-CN" dirty="0"/>
+              <a:t>Autoencoder</a:t>
+            </a:r>
+          </a:p>
+          <a:p>
+            <a:pPr lvl="1"/>
+            <a:r>
+              <a:rPr lang="en-US" altLang="zh-CN" dirty="0"/>
+              <a:t>K-means</a:t>
+            </a:r>
+          </a:p>
+          <a:p>
+            <a:r>
+              <a:rPr lang="en-US" altLang="zh-CN" dirty="0"/>
+              <a:t>HORDE</a:t>
+            </a:r>
+          </a:p>
+          <a:p>
+            <a:pPr lvl="1"/>
+            <a:r>
+              <a:rPr lang="en-US" altLang="zh-CN" dirty="0"/>
+              <a:t> Horde is off-policy</a:t>
+            </a:r>
+          </a:p>
+          <a:p>
+            <a:r>
+              <a:rPr lang="en-US" altLang="zh-CN" dirty="0"/>
+              <a:t>UNSUPERVISED AUXILIARY LEARNING</a:t>
+            </a:r>
+          </a:p>
+          <a:p>
+            <a:pPr lvl="1"/>
+            <a:r>
+              <a:rPr lang="en-US" altLang="zh-CN" dirty="0" err="1"/>
+              <a:t>Jaderberget</a:t>
+            </a:r>
+            <a:r>
+              <a:rPr lang="en-US" altLang="zh-CN" dirty="0"/>
+              <a:t> al.(2017) </a:t>
+            </a:r>
+            <a:r>
+              <a:rPr lang="en-US" altLang="zh-CN" dirty="0" err="1"/>
+              <a:t>proposedUNsupervised</a:t>
+            </a:r>
+            <a:r>
+              <a:rPr lang="en-US" altLang="zh-CN" dirty="0"/>
+              <a:t> </a:t>
+            </a:r>
+            <a:r>
+              <a:rPr lang="en-US" altLang="zh-CN" dirty="0" err="1"/>
+              <a:t>REinforcementand</a:t>
+            </a:r>
+            <a:r>
+              <a:rPr lang="en-US" altLang="zh-CN" dirty="0"/>
+              <a:t> Auxiliary Learning (UNREAL)</a:t>
+            </a:r>
+          </a:p>
+          <a:p>
+            <a:r>
+              <a:rPr lang="en-US" altLang="zh-CN" dirty="0"/>
+              <a:t> GENERATIVE ADVERSARIAL NETWORKS</a:t>
+            </a:r>
+          </a:p>
+          <a:p>
+            <a:endParaRPr lang="zh-CN" altLang="en-US" dirty="0"/>
+          </a:p>
+        </p:txBody>
+      </p:sp>
+    </p:spTree>
+    <p:extLst>
+      <p:ext uri="{BB962C8B-B14F-4D97-AF65-F5344CB8AC3E}">
+        <p14:creationId xmlns:p14="http://schemas.microsoft.com/office/powerpoint/2010/main" val="2959029400"/>
+      </p:ext>
+    </p:extLst>
+  </p:cSld>
+  <p:clrMapOvr>
+    <a:masterClrMapping/>
+  </p:clrMapOvr>
+</p:sld>
+</file>
+
+<file path=ppt/slides/slide14.xml><?xml version="1.0" encoding="utf-8"?>
+<p:sld xmlns:a="http://schemas.openxmlformats.org/drawingml/2006/main" xmlns:r="http://schemas.openxmlformats.org/officeDocument/2006/relationships" xmlns:p="http://schemas.openxmlformats.org/presentationml/2006/main">
+  <p:cSld>
+    <p:spTree>
+      <p:nvGrpSpPr>
+        <p:cNvPr id="1" name=""/>
+        <p:cNvGrpSpPr/>
+        <p:nvPr/>
+      </p:nvGrpSpPr>
+      <p:grpSpPr>
+        <a:xfrm>
+          <a:off x="0" y="0"/>
+          <a:ext cx="0" cy="0"/>
+          <a:chOff x="0" y="0"/>
+          <a:chExt cx="0" cy="0"/>
+        </a:xfrm>
+      </p:grpSpPr>
+      <p:sp>
+        <p:nvSpPr>
+          <p:cNvPr id="2" name="标题 1">
+            <a:extLst>
+              <a:ext uri="{FF2B5EF4-FFF2-40B4-BE49-F238E27FC236}">
+                <a16:creationId xmlns:a16="http://schemas.microsoft.com/office/drawing/2014/main" id="{30AA9177-0649-4E26-B034-2694ABF74FC9}"/>
+              </a:ext>
+            </a:extLst>
+          </p:cNvPr>
+          <p:cNvSpPr>
+            <a:spLocks noGrp="1"/>
+          </p:cNvSpPr>
+          <p:nvPr>
+            <p:ph type="title"/>
+          </p:nvPr>
+        </p:nvSpPr>
+        <p:spPr>
+          <a:xfrm>
+            <a:off x="838200" y="365125"/>
+            <a:ext cx="10515600" cy="1325563"/>
+          </a:xfrm>
+        </p:spPr>
+        <p:txBody>
+          <a:bodyPr/>
+          <a:lstStyle/>
+          <a:p>
+            <a:r>
+              <a:rPr lang="en-US" altLang="zh-CN" dirty="0"/>
+              <a:t>Important Mechanisms-Transfer learning</a:t>
+            </a:r>
+            <a:endParaRPr lang="zh-CN" altLang="en-US" dirty="0"/>
+          </a:p>
+        </p:txBody>
+      </p:sp>
+      <p:sp>
+        <p:nvSpPr>
+          <p:cNvPr id="3" name="内容占位符 2">
+            <a:extLst>
+              <a:ext uri="{FF2B5EF4-FFF2-40B4-BE49-F238E27FC236}">
+                <a16:creationId xmlns:a16="http://schemas.microsoft.com/office/drawing/2014/main" id="{7C6DED60-6030-4049-A4E9-BBD5973830D2}"/>
+              </a:ext>
+            </a:extLst>
+          </p:cNvPr>
+          <p:cNvSpPr>
+            <a:spLocks noGrp="1"/>
+          </p:cNvSpPr>
+          <p:nvPr>
+            <p:ph idx="1"/>
+          </p:nvPr>
+        </p:nvSpPr>
+        <p:spPr>
+          <a:xfrm>
+            <a:off x="838200" y="1825625"/>
+            <a:ext cx="10515600" cy="4351338"/>
+          </a:xfrm>
+        </p:spPr>
+        <p:txBody>
+          <a:bodyPr/>
+          <a:lstStyle/>
+          <a:p>
+            <a:r>
+              <a:rPr lang="en-US" altLang="zh-CN" dirty="0"/>
+              <a:t> reviewed in Pan and Yang (2010), </a:t>
+            </a:r>
+          </a:p>
+          <a:p>
+            <a:r>
+              <a:rPr lang="en-US" altLang="zh-CN" dirty="0"/>
+              <a:t>Gupta et al. (2017)</a:t>
+            </a:r>
+            <a:endParaRPr lang="zh-CN" altLang="en-US" dirty="0"/>
+          </a:p>
+        </p:txBody>
+      </p:sp>
+    </p:spTree>
+    <p:extLst>
+      <p:ext uri="{BB962C8B-B14F-4D97-AF65-F5344CB8AC3E}">
+        <p14:creationId xmlns:p14="http://schemas.microsoft.com/office/powerpoint/2010/main" val="2218719770"/>
+      </p:ext>
+    </p:extLst>
+  </p:cSld>
+  <p:clrMapOvr>
+    <a:masterClrMapping/>
+  </p:clrMapOvr>
+</p:sld>
+</file>
+
+<file path=ppt/slides/slide15.xml><?xml version="1.0" encoding="utf-8"?>
+<p:sld xmlns:a="http://schemas.openxmlformats.org/drawingml/2006/main" xmlns:r="http://schemas.openxmlformats.org/officeDocument/2006/relationships" xmlns:p="http://schemas.openxmlformats.org/presentationml/2006/main">
+  <p:cSld>
+    <p:spTree>
+      <p:nvGrpSpPr>
+        <p:cNvPr id="1" name=""/>
+        <p:cNvGrpSpPr/>
+        <p:nvPr/>
+      </p:nvGrpSpPr>
+      <p:grpSpPr>
+        <a:xfrm>
+          <a:off x="0" y="0"/>
+          <a:ext cx="0" cy="0"/>
+          <a:chOff x="0" y="0"/>
+          <a:chExt cx="0" cy="0"/>
+        </a:xfrm>
+      </p:grpSpPr>
+      <p:sp>
+        <p:nvSpPr>
+          <p:cNvPr id="2" name="标题 1">
+            <a:extLst>
+              <a:ext uri="{FF2B5EF4-FFF2-40B4-BE49-F238E27FC236}">
+                <a16:creationId xmlns:a16="http://schemas.microsoft.com/office/drawing/2014/main" id="{06E52271-24B9-44BA-AC8F-BE0430B77799}"/>
+              </a:ext>
+            </a:extLst>
+          </p:cNvPr>
+          <p:cNvSpPr>
+            <a:spLocks noGrp="1"/>
+          </p:cNvSpPr>
+          <p:nvPr>
+            <p:ph type="title"/>
+          </p:nvPr>
+        </p:nvSpPr>
+        <p:spPr/>
+        <p:txBody>
+          <a:bodyPr/>
+          <a:lstStyle/>
+          <a:p>
+            <a:r>
+              <a:rPr lang="en-US" altLang="zh-CN" dirty="0"/>
+              <a:t>Important Mechanism-MULTI-AGENT REINFORCEMENT LEARNING</a:t>
+            </a:r>
+            <a:endParaRPr lang="zh-CN" altLang="en-US" dirty="0"/>
+          </a:p>
+        </p:txBody>
+      </p:sp>
+      <p:sp>
+        <p:nvSpPr>
+          <p:cNvPr id="3" name="内容占位符 2">
+            <a:extLst>
+              <a:ext uri="{FF2B5EF4-FFF2-40B4-BE49-F238E27FC236}">
+                <a16:creationId xmlns:a16="http://schemas.microsoft.com/office/drawing/2014/main" id="{6BF4412E-5194-4983-91E3-90D55DD16470}"/>
+              </a:ext>
+            </a:extLst>
+          </p:cNvPr>
+          <p:cNvSpPr>
+            <a:spLocks noGrp="1"/>
+          </p:cNvSpPr>
+          <p:nvPr>
+            <p:ph idx="1"/>
+          </p:nvPr>
+        </p:nvSpPr>
+        <p:spPr/>
+        <p:txBody>
+          <a:bodyPr/>
+          <a:lstStyle/>
+          <a:p>
+            <a:r>
+              <a:rPr lang="en-US" altLang="zh-CN" dirty="0" err="1"/>
+              <a:t>Busoniu</a:t>
+            </a:r>
+            <a:r>
+              <a:rPr lang="en-US" altLang="zh-CN" dirty="0"/>
+              <a:t> et al. (2008) surveyed works in multi-agent RL</a:t>
+            </a:r>
+          </a:p>
+          <a:p>
+            <a:r>
+              <a:rPr lang="en-US" altLang="zh-CN" dirty="0"/>
+              <a:t>deep MARL algorithms (Foerster et al., 2017; Foerster et al., 2017; Lowe et al., 2017; </a:t>
+            </a:r>
+            <a:r>
+              <a:rPr lang="en-US" altLang="zh-CN" dirty="0" err="1"/>
+              <a:t>Omidshafieiet</a:t>
+            </a:r>
+            <a:r>
+              <a:rPr lang="en-US" altLang="zh-CN" dirty="0"/>
+              <a:t> al., 2017),</a:t>
+            </a:r>
+          </a:p>
+          <a:p>
+            <a:r>
+              <a:rPr lang="en-US" altLang="zh-CN" dirty="0"/>
+              <a:t> new communication mechanisms in MARL (Foerster et al., 2016; </a:t>
+            </a:r>
+            <a:r>
+              <a:rPr lang="en-US" altLang="zh-CN" dirty="0" err="1"/>
+              <a:t>Sukhbaatar</a:t>
+            </a:r>
+            <a:r>
+              <a:rPr lang="en-US" altLang="zh-CN" dirty="0"/>
+              <a:t> et al., 2016), </a:t>
+            </a:r>
+          </a:p>
+          <a:p>
+            <a:r>
+              <a:rPr lang="en-US" altLang="zh-CN" dirty="0"/>
+              <a:t>and sequential social dilemmas with MARL (</a:t>
+            </a:r>
+            <a:r>
+              <a:rPr lang="en-US" altLang="zh-CN" dirty="0" err="1"/>
+              <a:t>Leibo</a:t>
+            </a:r>
+            <a:r>
+              <a:rPr lang="en-US" altLang="zh-CN" dirty="0"/>
+              <a:t> et al., 2017).1</a:t>
+            </a:r>
+          </a:p>
+          <a:p>
+            <a:endParaRPr lang="zh-CN" altLang="en-US" dirty="0"/>
+          </a:p>
+        </p:txBody>
+      </p:sp>
+    </p:spTree>
+    <p:extLst>
+      <p:ext uri="{BB962C8B-B14F-4D97-AF65-F5344CB8AC3E}">
+        <p14:creationId xmlns:p14="http://schemas.microsoft.com/office/powerpoint/2010/main" val="3122115762"/>
+      </p:ext>
+    </p:extLst>
+  </p:cSld>
+  <p:clrMapOvr>
+    <a:masterClrMapping/>
+  </p:clrMapOvr>
+</p:sld>
+</file>
+
+<file path=ppt/slides/slide16.xml><?xml version="1.0" encoding="utf-8"?>
+<p:sld xmlns:a="http://schemas.openxmlformats.org/drawingml/2006/main" xmlns:r="http://schemas.openxmlformats.org/officeDocument/2006/relationships" xmlns:p="http://schemas.openxmlformats.org/presentationml/2006/main">
+  <p:cSld>
+    <p:spTree>
+      <p:nvGrpSpPr>
+        <p:cNvPr id="1" name=""/>
+        <p:cNvGrpSpPr/>
+        <p:nvPr/>
+      </p:nvGrpSpPr>
+      <p:grpSpPr>
+        <a:xfrm>
+          <a:off x="0" y="0"/>
+          <a:ext cx="0" cy="0"/>
+          <a:chOff x="0" y="0"/>
+          <a:chExt cx="0" cy="0"/>
+        </a:xfrm>
+      </p:grpSpPr>
+      <p:sp>
+        <p:nvSpPr>
+          <p:cNvPr id="2" name="标题 1">
+            <a:extLst>
+              <a:ext uri="{FF2B5EF4-FFF2-40B4-BE49-F238E27FC236}">
+                <a16:creationId xmlns:a16="http://schemas.microsoft.com/office/drawing/2014/main" id="{9DAA9207-CD32-4729-A243-619E9DFB9B54}"/>
+              </a:ext>
+            </a:extLst>
+          </p:cNvPr>
+          <p:cNvSpPr>
+            <a:spLocks noGrp="1"/>
+          </p:cNvSpPr>
+          <p:nvPr>
+            <p:ph type="title"/>
+          </p:nvPr>
+        </p:nvSpPr>
+        <p:spPr/>
+        <p:txBody>
+          <a:bodyPr>
+            <a:normAutofit/>
+          </a:bodyPr>
+          <a:lstStyle/>
+          <a:p>
+            <a:r>
+              <a:rPr lang="en-US" altLang="zh-CN" dirty="0"/>
+              <a:t>Important Mechanism-HIERARCHICAL REINFORCEMENT LEARNING</a:t>
+            </a:r>
+            <a:endParaRPr lang="zh-CN" altLang="en-US" dirty="0"/>
+          </a:p>
+        </p:txBody>
+      </p:sp>
+      <p:sp>
+        <p:nvSpPr>
+          <p:cNvPr id="3" name="内容占位符 2">
+            <a:extLst>
+              <a:ext uri="{FF2B5EF4-FFF2-40B4-BE49-F238E27FC236}">
+                <a16:creationId xmlns:a16="http://schemas.microsoft.com/office/drawing/2014/main" id="{94F7C358-B9AC-4321-A89A-02FBA936B0C0}"/>
+              </a:ext>
+            </a:extLst>
+          </p:cNvPr>
+          <p:cNvSpPr>
+            <a:spLocks noGrp="1"/>
+          </p:cNvSpPr>
+          <p:nvPr>
+            <p:ph idx="1"/>
+          </p:nvPr>
+        </p:nvSpPr>
+        <p:spPr/>
+        <p:txBody>
+          <a:bodyPr/>
+          <a:lstStyle/>
+          <a:p>
+            <a:r>
+              <a:rPr lang="en-US" altLang="zh-CN" dirty="0"/>
+              <a:t>Kulkarni et al. (2016) proposed hierarchical-DQN (h-DQN)</a:t>
+            </a:r>
+          </a:p>
+          <a:p>
+            <a:r>
+              <a:rPr lang="en-US" altLang="zh-CN" dirty="0" err="1"/>
+              <a:t>Florensa</a:t>
+            </a:r>
+            <a:r>
+              <a:rPr lang="en-US" altLang="zh-CN" dirty="0"/>
+              <a:t> et al. (2017)</a:t>
+            </a:r>
+          </a:p>
+          <a:p>
+            <a:r>
+              <a:rPr lang="en-US" altLang="zh-CN" dirty="0"/>
+              <a:t>Tessler et al. (2017) proposed a hierarchical deep RL network architecture for lifelong learning.</a:t>
+            </a:r>
+            <a:endParaRPr lang="zh-CN" altLang="en-US" dirty="0"/>
+          </a:p>
+        </p:txBody>
+      </p:sp>
+    </p:spTree>
+    <p:extLst>
+      <p:ext uri="{BB962C8B-B14F-4D97-AF65-F5344CB8AC3E}">
+        <p14:creationId xmlns:p14="http://schemas.microsoft.com/office/powerpoint/2010/main" val="4034714594"/>
+      </p:ext>
+    </p:extLst>
+  </p:cSld>
+  <p:clrMapOvr>
+    <a:masterClrMapping/>
+  </p:clrMapOvr>
+</p:sld>
+</file>
+
+<file path=ppt/slides/slide17.xml><?xml version="1.0" encoding="utf-8"?>
+<p:sld xmlns:a="http://schemas.openxmlformats.org/drawingml/2006/main" xmlns:r="http://schemas.openxmlformats.org/officeDocument/2006/relationships" xmlns:p="http://schemas.openxmlformats.org/presentationml/2006/main">
+  <p:cSld>
+    <p:spTree>
+      <p:nvGrpSpPr>
+        <p:cNvPr id="1" name=""/>
+        <p:cNvGrpSpPr/>
+        <p:nvPr/>
+      </p:nvGrpSpPr>
+      <p:grpSpPr>
+        <a:xfrm>
+          <a:off x="0" y="0"/>
+          <a:ext cx="0" cy="0"/>
+          <a:chOff x="0" y="0"/>
+          <a:chExt cx="0" cy="0"/>
+        </a:xfrm>
+      </p:grpSpPr>
+      <p:sp>
+        <p:nvSpPr>
+          <p:cNvPr id="2" name="标题 1">
+            <a:extLst>
+              <a:ext uri="{FF2B5EF4-FFF2-40B4-BE49-F238E27FC236}">
+                <a16:creationId xmlns:a16="http://schemas.microsoft.com/office/drawing/2014/main" id="{5E355225-5262-484B-897E-FDB2F84F7403}"/>
+              </a:ext>
+            </a:extLst>
+          </p:cNvPr>
+          <p:cNvSpPr>
+            <a:spLocks noGrp="1"/>
+          </p:cNvSpPr>
+          <p:nvPr>
+            <p:ph type="title"/>
+          </p:nvPr>
+        </p:nvSpPr>
+        <p:spPr/>
+        <p:txBody>
+          <a:bodyPr/>
+          <a:lstStyle/>
+          <a:p>
+            <a:r>
+              <a:rPr lang="en-US" altLang="zh-CN" dirty="0"/>
+              <a:t>Important Mechanism-LEARNING TO LEARN</a:t>
+            </a:r>
+            <a:endParaRPr lang="zh-CN" altLang="en-US" dirty="0"/>
+          </a:p>
+        </p:txBody>
+      </p:sp>
+      <p:sp>
+        <p:nvSpPr>
+          <p:cNvPr id="3" name="内容占位符 2">
+            <a:extLst>
+              <a:ext uri="{FF2B5EF4-FFF2-40B4-BE49-F238E27FC236}">
+                <a16:creationId xmlns:a16="http://schemas.microsoft.com/office/drawing/2014/main" id="{28ADA0D8-C2BE-40C5-8183-1C86C620C4AE}"/>
+              </a:ext>
+            </a:extLst>
+          </p:cNvPr>
+          <p:cNvSpPr>
+            <a:spLocks noGrp="1"/>
+          </p:cNvSpPr>
+          <p:nvPr>
+            <p:ph idx="1"/>
+          </p:nvPr>
+        </p:nvSpPr>
+        <p:spPr/>
+        <p:txBody>
+          <a:bodyPr/>
+          <a:lstStyle/>
+          <a:p>
+            <a:r>
+              <a:rPr lang="en-US" altLang="zh-CN" dirty="0"/>
+              <a:t>It is a core ingredient to achieve strong AI (Lake et al., 2016)</a:t>
+            </a:r>
+          </a:p>
+          <a:p>
+            <a:r>
+              <a:rPr lang="en-US" altLang="zh-CN" dirty="0"/>
+              <a:t>Li and Malik (2017)</a:t>
+            </a:r>
+          </a:p>
+          <a:p>
+            <a:r>
+              <a:rPr lang="en-US" altLang="zh-CN" dirty="0"/>
+              <a:t>Lake et al. (2015) proposed an one-shot concept learning mode</a:t>
+            </a:r>
+          </a:p>
+          <a:p>
+            <a:r>
+              <a:rPr lang="en-US" altLang="zh-CN" dirty="0" err="1"/>
+              <a:t>Duan</a:t>
+            </a:r>
+            <a:r>
+              <a:rPr lang="en-US" altLang="zh-CN" dirty="0"/>
+              <a:t> et al. (2017) proposed a model for one-shot imitation learning with attention for robotics. </a:t>
+            </a:r>
+          </a:p>
+          <a:p>
+            <a:r>
+              <a:rPr lang="en-US" altLang="zh-CN" dirty="0"/>
+              <a:t>Ravi and Larochelle (2017) proposed a meta-learning model for few shot learning</a:t>
+            </a:r>
+            <a:endParaRPr lang="zh-CN" altLang="en-US" dirty="0"/>
+          </a:p>
+        </p:txBody>
+      </p:sp>
+    </p:spTree>
+    <p:extLst>
+      <p:ext uri="{BB962C8B-B14F-4D97-AF65-F5344CB8AC3E}">
+        <p14:creationId xmlns:p14="http://schemas.microsoft.com/office/powerpoint/2010/main" val="3929513610"/>
+      </p:ext>
+    </p:extLst>
+  </p:cSld>
+  <p:clrMapOvr>
+    <a:masterClrMapping/>
+  </p:clrMapOvr>
+</p:sld>
+</file>
+
+<file path=ppt/slides/slide18.xml><?xml version="1.0" encoding="utf-8"?>
+<p:sld xmlns:a="http://schemas.openxmlformats.org/drawingml/2006/main" xmlns:r="http://schemas.openxmlformats.org/officeDocument/2006/relationships" xmlns:p="http://schemas.openxmlformats.org/presentationml/2006/main">
+  <p:cSld>
+    <p:spTree>
+      <p:nvGrpSpPr>
+        <p:cNvPr id="1" name=""/>
+        <p:cNvGrpSpPr/>
+        <p:nvPr/>
+      </p:nvGrpSpPr>
+      <p:grpSpPr>
+        <a:xfrm>
+          <a:off x="0" y="0"/>
+          <a:ext cx="0" cy="0"/>
+          <a:chOff x="0" y="0"/>
+          <a:chExt cx="0" cy="0"/>
+        </a:xfrm>
+      </p:grpSpPr>
+      <p:sp>
+        <p:nvSpPr>
+          <p:cNvPr id="2" name="标题 1">
+            <a:extLst>
+              <a:ext uri="{FF2B5EF4-FFF2-40B4-BE49-F238E27FC236}">
+                <a16:creationId xmlns:a16="http://schemas.microsoft.com/office/drawing/2014/main" id="{0291CF8D-45BD-41B7-88D4-F6DEEB2E92EF}"/>
+              </a:ext>
+            </a:extLst>
+          </p:cNvPr>
+          <p:cNvSpPr>
+            <a:spLocks noGrp="1"/>
+          </p:cNvSpPr>
+          <p:nvPr>
+            <p:ph type="title"/>
+          </p:nvPr>
+        </p:nvSpPr>
+        <p:spPr/>
+        <p:txBody>
+          <a:bodyPr/>
+          <a:lstStyle/>
+          <a:p>
+            <a:r>
+              <a:rPr lang="en-US" altLang="zh-CN" dirty="0"/>
+              <a:t>Applications</a:t>
+            </a:r>
+            <a:endParaRPr lang="zh-CN" altLang="en-US" dirty="0"/>
+          </a:p>
+        </p:txBody>
+      </p:sp>
+      <p:sp>
+        <p:nvSpPr>
+          <p:cNvPr id="3" name="内容占位符 2">
+            <a:extLst>
+              <a:ext uri="{FF2B5EF4-FFF2-40B4-BE49-F238E27FC236}">
+                <a16:creationId xmlns:a16="http://schemas.microsoft.com/office/drawing/2014/main" id="{DF688F3A-C07F-430B-9FFE-AE90E45F280E}"/>
+              </a:ext>
+            </a:extLst>
+          </p:cNvPr>
+          <p:cNvSpPr>
+            <a:spLocks noGrp="1"/>
+          </p:cNvSpPr>
+          <p:nvPr>
+            <p:ph idx="1"/>
+          </p:nvPr>
+        </p:nvSpPr>
+        <p:spPr/>
+        <p:txBody>
+          <a:bodyPr>
+            <a:normAutofit fontScale="77500" lnSpcReduction="20000"/>
+          </a:bodyPr>
+          <a:lstStyle/>
+          <a:p>
+            <a:r>
+              <a:rPr lang="en-US" altLang="zh-CN" dirty="0"/>
+              <a:t>1 games, </a:t>
+            </a:r>
+          </a:p>
+          <a:p>
+            <a:r>
+              <a:rPr lang="en-US" altLang="zh-CN" dirty="0"/>
+              <a:t>2 robotics,</a:t>
+            </a:r>
+          </a:p>
+          <a:p>
+            <a:r>
+              <a:rPr lang="en-US" altLang="zh-CN" dirty="0"/>
+              <a:t> 3 natural language processing, </a:t>
+            </a:r>
+          </a:p>
+          <a:p>
+            <a:r>
+              <a:rPr lang="en-US" altLang="zh-CN" dirty="0"/>
+              <a:t>4computer vision, </a:t>
+            </a:r>
+          </a:p>
+          <a:p>
+            <a:r>
+              <a:rPr lang="en-US" altLang="zh-CN" dirty="0"/>
+              <a:t>5 neural architecture design, </a:t>
+            </a:r>
+          </a:p>
+          <a:p>
+            <a:r>
+              <a:rPr lang="en-US" altLang="zh-CN" dirty="0"/>
+              <a:t>6 business management, </a:t>
+            </a:r>
+          </a:p>
+          <a:p>
+            <a:r>
+              <a:rPr lang="en-US" altLang="zh-CN" dirty="0"/>
+              <a:t>7 finance, </a:t>
+            </a:r>
+          </a:p>
+          <a:p>
+            <a:r>
+              <a:rPr lang="en-US" altLang="zh-CN" dirty="0"/>
+              <a:t>8 healthcare, </a:t>
+            </a:r>
+          </a:p>
+          <a:p>
+            <a:r>
+              <a:rPr lang="en-US" altLang="zh-CN" dirty="0"/>
+              <a:t>9 Industry-4.0, </a:t>
+            </a:r>
+          </a:p>
+          <a:p>
+            <a:r>
+              <a:rPr lang="en-US" altLang="zh-CN" dirty="0"/>
+              <a:t>10 smart grid, </a:t>
+            </a:r>
+          </a:p>
+          <a:p>
+            <a:r>
+              <a:rPr lang="en-US" altLang="zh-CN" dirty="0"/>
+              <a:t>11intelligent transportation systems,</a:t>
+            </a:r>
+          </a:p>
+          <a:p>
+            <a:r>
+              <a:rPr lang="en-US" altLang="zh-CN" dirty="0"/>
+              <a:t>12 computer systems.</a:t>
+            </a:r>
+          </a:p>
+          <a:p>
+            <a:endParaRPr lang="zh-CN" altLang="en-US" dirty="0"/>
+          </a:p>
+        </p:txBody>
+      </p:sp>
+    </p:spTree>
+    <p:extLst>
+      <p:ext uri="{BB962C8B-B14F-4D97-AF65-F5344CB8AC3E}">
+        <p14:creationId xmlns:p14="http://schemas.microsoft.com/office/powerpoint/2010/main" val="2444419378"/>
+      </p:ext>
+    </p:extLst>
+  </p:cSld>
+  <p:clrMapOvr>
+    <a:masterClrMapping/>
+  </p:clrMapOvr>
+</p:sld>
+</file>
+
+<file path=ppt/slides/slide19.xml><?xml version="1.0" encoding="utf-8"?>
+<p:sld xmlns:a="http://schemas.openxmlformats.org/drawingml/2006/main" xmlns:r="http://schemas.openxmlformats.org/officeDocument/2006/relationships" xmlns:p="http://schemas.openxmlformats.org/presentationml/2006/main">
+  <p:cSld>
+    <p:spTree>
+      <p:nvGrpSpPr>
+        <p:cNvPr id="1" name=""/>
+        <p:cNvGrpSpPr/>
+        <p:nvPr/>
+      </p:nvGrpSpPr>
+      <p:grpSpPr>
+        <a:xfrm>
+          <a:off x="0" y="0"/>
+          <a:ext cx="0" cy="0"/>
+          <a:chOff x="0" y="0"/>
+          <a:chExt cx="0" cy="0"/>
+        </a:xfrm>
+      </p:grpSpPr>
+      <p:sp>
+        <p:nvSpPr>
+          <p:cNvPr id="2" name="标题 1">
+            <a:extLst>
+              <a:ext uri="{FF2B5EF4-FFF2-40B4-BE49-F238E27FC236}">
+                <a16:creationId xmlns:a16="http://schemas.microsoft.com/office/drawing/2014/main" id="{6B983841-8947-4FB7-9848-FB9F887A3ADA}"/>
+              </a:ext>
+            </a:extLst>
+          </p:cNvPr>
+          <p:cNvSpPr>
+            <a:spLocks noGrp="1"/>
+          </p:cNvSpPr>
+          <p:nvPr>
+            <p:ph type="title"/>
+          </p:nvPr>
+        </p:nvSpPr>
+        <p:spPr/>
+        <p:txBody>
+          <a:bodyPr/>
+          <a:lstStyle/>
+          <a:p>
+            <a:r>
+              <a:rPr lang="en-US" altLang="zh-CN" dirty="0"/>
+              <a:t>More topics</a:t>
+            </a:r>
+            <a:endParaRPr lang="zh-CN" altLang="en-US" dirty="0"/>
+          </a:p>
+        </p:txBody>
+      </p:sp>
+      <p:sp>
+        <p:nvSpPr>
+          <p:cNvPr id="3" name="内容占位符 2">
+            <a:extLst>
+              <a:ext uri="{FF2B5EF4-FFF2-40B4-BE49-F238E27FC236}">
+                <a16:creationId xmlns:a16="http://schemas.microsoft.com/office/drawing/2014/main" id="{D7DC22A9-D03E-4142-A15C-230EF29C2174}"/>
+              </a:ext>
+            </a:extLst>
+          </p:cNvPr>
+          <p:cNvSpPr>
+            <a:spLocks noGrp="1"/>
+          </p:cNvSpPr>
+          <p:nvPr>
+            <p:ph idx="1"/>
+          </p:nvPr>
+        </p:nvSpPr>
+        <p:spPr/>
+        <p:txBody>
+          <a:bodyPr/>
+          <a:lstStyle/>
+          <a:p>
+            <a:endParaRPr lang="zh-CN" altLang="en-US"/>
+          </a:p>
+        </p:txBody>
+      </p:sp>
+    </p:spTree>
+    <p:extLst>
+      <p:ext uri="{BB962C8B-B14F-4D97-AF65-F5344CB8AC3E}">
+        <p14:creationId xmlns:p14="http://schemas.microsoft.com/office/powerpoint/2010/main" val="427439659"/>
+      </p:ext>
+    </p:extLst>
+  </p:cSld>
+  <p:clrMapOvr>
+    <a:masterClrMapping/>
+  </p:clrMapOvr>
+</p:sld>
+</file>
+
 <file path=ppt/slides/slide2.xml><?xml version="1.0" encoding="utf-8"?>
 <p:sld xmlns:a="http://schemas.openxmlformats.org/drawingml/2006/main" xmlns:r="http://schemas.openxmlformats.org/officeDocument/2006/relationships" xmlns:p="http://schemas.openxmlformats.org/presentationml/2006/main">
   <p:cSld>
@@ -3476,8 +5640,15 @@
             </a:r>
             <a:r>
               <a:rPr lang="en-US" altLang="zh-CN" dirty="0"/>
-              <a:t>    &gt; &gt;&gt; </a:t>
-            </a:r>
+              <a:t>    </a:t>
+            </a:r>
+            <a:r>
+              <a:rPr lang="en-US" altLang="zh-CN" dirty="0">
+                <a:hlinkClick r:id="rId3" action="ppaction://hlinksldjump"/>
+              </a:rPr>
+              <a:t>&gt; &gt;&gt; </a:t>
+            </a:r>
+            <a:endParaRPr lang="en-US" altLang="zh-CN" dirty="0"/>
           </a:p>
           <a:p>
             <a:r>
@@ -3491,6 +5662,250 @@
     <p:extLst>
       <p:ext uri="{BB962C8B-B14F-4D97-AF65-F5344CB8AC3E}">
         <p14:creationId xmlns:p14="http://schemas.microsoft.com/office/powerpoint/2010/main" val="3070114160"/>
+      </p:ext>
+    </p:extLst>
+  </p:cSld>
+  <p:clrMapOvr>
+    <a:masterClrMapping/>
+  </p:clrMapOvr>
+</p:sld>
+</file>
+
+<file path=ppt/slides/slide20.xml><?xml version="1.0" encoding="utf-8"?>
+<p:sld xmlns:a="http://schemas.openxmlformats.org/drawingml/2006/main" xmlns:r="http://schemas.openxmlformats.org/officeDocument/2006/relationships" xmlns:p="http://schemas.openxmlformats.org/presentationml/2006/main">
+  <p:cSld>
+    <p:spTree>
+      <p:nvGrpSpPr>
+        <p:cNvPr id="1" name=""/>
+        <p:cNvGrpSpPr/>
+        <p:nvPr/>
+      </p:nvGrpSpPr>
+      <p:grpSpPr>
+        <a:xfrm>
+          <a:off x="0" y="0"/>
+          <a:ext cx="0" cy="0"/>
+          <a:chOff x="0" y="0"/>
+          <a:chExt cx="0" cy="0"/>
+        </a:xfrm>
+      </p:grpSpPr>
+      <p:sp>
+        <p:nvSpPr>
+          <p:cNvPr id="2" name="标题 1">
+            <a:extLst>
+              <a:ext uri="{FF2B5EF4-FFF2-40B4-BE49-F238E27FC236}">
+                <a16:creationId xmlns:a16="http://schemas.microsoft.com/office/drawing/2014/main" id="{54DC5724-C655-4751-9B79-0E079FD96F36}"/>
+              </a:ext>
+            </a:extLst>
+          </p:cNvPr>
+          <p:cNvSpPr>
+            <a:spLocks noGrp="1"/>
+          </p:cNvSpPr>
+          <p:nvPr>
+            <p:ph type="title"/>
+          </p:nvPr>
+        </p:nvSpPr>
+        <p:spPr/>
+        <p:txBody>
+          <a:bodyPr/>
+          <a:lstStyle/>
+          <a:p>
+            <a:r>
+              <a:rPr lang="en-US" altLang="zh-CN" dirty="0"/>
+              <a:t>Resources</a:t>
+            </a:r>
+            <a:endParaRPr lang="zh-CN" altLang="en-US" dirty="0"/>
+          </a:p>
+        </p:txBody>
+      </p:sp>
+      <p:sp>
+        <p:nvSpPr>
+          <p:cNvPr id="3" name="内容占位符 2">
+            <a:extLst>
+              <a:ext uri="{FF2B5EF4-FFF2-40B4-BE49-F238E27FC236}">
+                <a16:creationId xmlns:a16="http://schemas.microsoft.com/office/drawing/2014/main" id="{E3660751-F6CA-48A5-B8C7-88BD7D9942C1}"/>
+              </a:ext>
+            </a:extLst>
+          </p:cNvPr>
+          <p:cNvSpPr>
+            <a:spLocks noGrp="1"/>
+          </p:cNvSpPr>
+          <p:nvPr>
+            <p:ph idx="1"/>
+          </p:nvPr>
+        </p:nvSpPr>
+        <p:spPr/>
+        <p:txBody>
+          <a:bodyPr/>
+          <a:lstStyle/>
+          <a:p>
+            <a:endParaRPr lang="zh-CN" altLang="en-US"/>
+          </a:p>
+        </p:txBody>
+      </p:sp>
+    </p:spTree>
+    <p:extLst>
+      <p:ext uri="{BB962C8B-B14F-4D97-AF65-F5344CB8AC3E}">
+        <p14:creationId xmlns:p14="http://schemas.microsoft.com/office/powerpoint/2010/main" val="182775254"/>
+      </p:ext>
+    </p:extLst>
+  </p:cSld>
+  <p:clrMapOvr>
+    <a:masterClrMapping/>
+  </p:clrMapOvr>
+</p:sld>
+</file>
+
+<file path=ppt/slides/slide21.xml><?xml version="1.0" encoding="utf-8"?>
+<p:sld xmlns:a="http://schemas.openxmlformats.org/drawingml/2006/main" xmlns:r="http://schemas.openxmlformats.org/officeDocument/2006/relationships" xmlns:p="http://schemas.openxmlformats.org/presentationml/2006/main">
+  <p:cSld>
+    <p:spTree>
+      <p:nvGrpSpPr>
+        <p:cNvPr id="1" name=""/>
+        <p:cNvGrpSpPr/>
+        <p:nvPr/>
+      </p:nvGrpSpPr>
+      <p:grpSpPr>
+        <a:xfrm>
+          <a:off x="0" y="0"/>
+          <a:ext cx="0" cy="0"/>
+          <a:chOff x="0" y="0"/>
+          <a:chExt cx="0" cy="0"/>
+        </a:xfrm>
+      </p:grpSpPr>
+      <p:sp>
+        <p:nvSpPr>
+          <p:cNvPr id="2" name="标题 1">
+            <a:extLst>
+              <a:ext uri="{FF2B5EF4-FFF2-40B4-BE49-F238E27FC236}">
+                <a16:creationId xmlns:a16="http://schemas.microsoft.com/office/drawing/2014/main" id="{FAD37986-D937-48A1-A72B-F4A1D7AF0DD2}"/>
+              </a:ext>
+            </a:extLst>
+          </p:cNvPr>
+          <p:cNvSpPr>
+            <a:spLocks noGrp="1"/>
+          </p:cNvSpPr>
+          <p:nvPr>
+            <p:ph type="title"/>
+          </p:nvPr>
+        </p:nvSpPr>
+        <p:spPr/>
+        <p:txBody>
+          <a:bodyPr/>
+          <a:lstStyle/>
+          <a:p>
+            <a:endParaRPr lang="zh-CN" altLang="en-US"/>
+          </a:p>
+        </p:txBody>
+      </p:sp>
+      <p:sp>
+        <p:nvSpPr>
+          <p:cNvPr id="3" name="内容占位符 2">
+            <a:extLst>
+              <a:ext uri="{FF2B5EF4-FFF2-40B4-BE49-F238E27FC236}">
+                <a16:creationId xmlns:a16="http://schemas.microsoft.com/office/drawing/2014/main" id="{BA8992A5-BC87-4BE5-AE88-DEA35E233A5B}"/>
+              </a:ext>
+            </a:extLst>
+          </p:cNvPr>
+          <p:cNvSpPr>
+            <a:spLocks noGrp="1"/>
+          </p:cNvSpPr>
+          <p:nvPr>
+            <p:ph idx="1"/>
+          </p:nvPr>
+        </p:nvSpPr>
+        <p:spPr/>
+        <p:txBody>
+          <a:bodyPr/>
+          <a:lstStyle/>
+          <a:p>
+            <a:endParaRPr lang="zh-CN" altLang="en-US"/>
+          </a:p>
+        </p:txBody>
+      </p:sp>
+    </p:spTree>
+    <p:extLst>
+      <p:ext uri="{BB962C8B-B14F-4D97-AF65-F5344CB8AC3E}">
+        <p14:creationId xmlns:p14="http://schemas.microsoft.com/office/powerpoint/2010/main" val="4193153234"/>
+      </p:ext>
+    </p:extLst>
+  </p:cSld>
+  <p:clrMapOvr>
+    <a:masterClrMapping/>
+  </p:clrMapOvr>
+</p:sld>
+</file>
+
+<file path=ppt/slides/slide22.xml><?xml version="1.0" encoding="utf-8"?>
+<p:sld xmlns:a="http://schemas.openxmlformats.org/drawingml/2006/main" xmlns:r="http://schemas.openxmlformats.org/officeDocument/2006/relationships" xmlns:p="http://schemas.openxmlformats.org/presentationml/2006/main">
+  <p:cSld>
+    <p:spTree>
+      <p:nvGrpSpPr>
+        <p:cNvPr id="1" name=""/>
+        <p:cNvGrpSpPr/>
+        <p:nvPr/>
+      </p:nvGrpSpPr>
+      <p:grpSpPr>
+        <a:xfrm>
+          <a:off x="0" y="0"/>
+          <a:ext cx="0" cy="0"/>
+          <a:chOff x="0" y="0"/>
+          <a:chExt cx="0" cy="0"/>
+        </a:xfrm>
+      </p:grpSpPr>
+      <p:sp>
+        <p:nvSpPr>
+          <p:cNvPr id="4" name="标题 3">
+            <a:extLst>
+              <a:ext uri="{FF2B5EF4-FFF2-40B4-BE49-F238E27FC236}">
+                <a16:creationId xmlns:a16="http://schemas.microsoft.com/office/drawing/2014/main" id="{FD926584-6DE2-4D47-9F57-D6562072569F}"/>
+              </a:ext>
+            </a:extLst>
+          </p:cNvPr>
+          <p:cNvSpPr>
+            <a:spLocks noGrp="1"/>
+          </p:cNvSpPr>
+          <p:nvPr>
+            <p:ph type="title"/>
+          </p:nvPr>
+        </p:nvSpPr>
+        <p:spPr/>
+        <p:txBody>
+          <a:bodyPr/>
+          <a:lstStyle/>
+          <a:p>
+            <a:endParaRPr lang="zh-CN" altLang="en-US"/>
+          </a:p>
+        </p:txBody>
+      </p:sp>
+      <p:sp>
+        <p:nvSpPr>
+          <p:cNvPr id="5" name="文本占位符 4">
+            <a:extLst>
+              <a:ext uri="{FF2B5EF4-FFF2-40B4-BE49-F238E27FC236}">
+                <a16:creationId xmlns:a16="http://schemas.microsoft.com/office/drawing/2014/main" id="{193530CE-E274-4A43-9C4E-04E97908A0F8}"/>
+              </a:ext>
+            </a:extLst>
+          </p:cNvPr>
+          <p:cNvSpPr>
+            <a:spLocks noGrp="1"/>
+          </p:cNvSpPr>
+          <p:nvPr>
+            <p:ph type="body" idx="1"/>
+          </p:nvPr>
+        </p:nvSpPr>
+        <p:spPr/>
+        <p:txBody>
+          <a:bodyPr/>
+          <a:lstStyle/>
+          <a:p>
+            <a:endParaRPr lang="zh-CN" altLang="en-US"/>
+          </a:p>
+        </p:txBody>
+      </p:sp>
+    </p:spTree>
+    <p:extLst>
+      <p:ext uri="{BB962C8B-B14F-4D97-AF65-F5344CB8AC3E}">
+        <p14:creationId xmlns:p14="http://schemas.microsoft.com/office/powerpoint/2010/main" val="4017534203"/>
       </p:ext>
     </p:extLst>
   </p:cSld>
@@ -3568,14 +5983,61 @@
           <a:lstStyle/>
           <a:p>
             <a:r>
-              <a:rPr lang="en-US" altLang="zh-CN" dirty="0" err="1"/>
+              <a:rPr lang="en-US" altLang="zh-CN"/>
               <a:t>YuxiLi</a:t>
             </a:r>
-            <a:r>
-              <a:rPr lang="en-US" altLang="zh-CN" dirty="0"/>
-              <a:t>(yuxili@gmail.com</a:t>
-            </a:r>
             <a:endParaRPr lang="zh-CN" altLang="en-US" dirty="0"/>
+          </a:p>
+        </p:txBody>
+      </p:sp>
+      <p:sp>
+        <p:nvSpPr>
+          <p:cNvPr id="2" name="箭头: 右弧形 1">
+            <a:hlinkClick r:id="rId3" action="ppaction://hlinksldjump"/>
+            <a:extLst>
+              <a:ext uri="{FF2B5EF4-FFF2-40B4-BE49-F238E27FC236}">
+                <a16:creationId xmlns:a16="http://schemas.microsoft.com/office/drawing/2014/main" id="{AC01C90D-EC78-4023-A88D-B9D51B1F90E3}"/>
+              </a:ext>
+            </a:extLst>
+          </p:cNvPr>
+          <p:cNvSpPr/>
+          <p:nvPr/>
+        </p:nvSpPr>
+        <p:spPr>
+          <a:xfrm>
+            <a:off x="10678160" y="5334000"/>
+            <a:ext cx="497840" cy="755650"/>
+          </a:xfrm>
+          <a:prstGeom prst="curvedLeftArrow">
+            <a:avLst/>
+          </a:prstGeom>
+        </p:spPr>
+        <p:style>
+          <a:lnRef idx="2">
+            <a:schemeClr val="accent1">
+              <a:shade val="50000"/>
+            </a:schemeClr>
+          </a:lnRef>
+          <a:fillRef idx="1">
+            <a:schemeClr val="accent1"/>
+          </a:fillRef>
+          <a:effectRef idx="0">
+            <a:schemeClr val="accent1"/>
+          </a:effectRef>
+          <a:fontRef idx="minor">
+            <a:schemeClr val="lt1"/>
+          </a:fontRef>
+        </p:style>
+        <p:txBody>
+          <a:bodyPr rtlCol="0" anchor="ctr"/>
+          <a:lstStyle/>
+          <a:p>
+            <a:pPr algn="ctr"/>
+            <a:endParaRPr lang="zh-CN" altLang="en-US">
+              <a:solidFill>
+                <a:schemeClr val="tx1"/>
+              </a:solidFill>
+            </a:endParaRPr>
           </a:p>
         </p:txBody>
       </p:sp>
@@ -3760,7 +6222,11 @@
           <a:bodyPr/>
           <a:lstStyle/>
           <a:p>
-            <a:endParaRPr lang="zh-CN" altLang="en-US"/>
+            <a:r>
+              <a:rPr lang="en-US" altLang="zh-CN" dirty="0"/>
+              <a:t>Introduction </a:t>
+            </a:r>
+            <a:endParaRPr lang="zh-CN" altLang="en-US" dirty="0"/>
           </a:p>
         </p:txBody>
       </p:sp>
@@ -3785,7 +6251,40 @@
           <a:bodyPr/>
           <a:lstStyle/>
           <a:p>
-            <a:endParaRPr lang="zh-CN" altLang="en-US"/>
+            <a:r>
+              <a:rPr lang="en-US" altLang="zh-CN" dirty="0"/>
+              <a:t>RL</a:t>
+            </a:r>
+            <a:r>
+              <a:rPr lang="zh-CN" altLang="en-US" dirty="0"/>
+              <a:t>定义：</a:t>
+            </a:r>
+            <a:endParaRPr lang="en-US" altLang="zh-CN" dirty="0"/>
+          </a:p>
+          <a:p>
+            <a:pPr lvl="1"/>
+            <a:r>
+              <a:rPr lang="en-US" altLang="zh-CN" dirty="0"/>
+              <a:t>Reinforcement learning(RL) is about an agent interacting with the environment, learning an optimal policy, by trail and error, for sequential decision making problems in a wide range of ﬁelds in both natural and social sciences, and engineering</a:t>
+            </a:r>
+            <a:r>
+              <a:rPr lang="zh-CN" altLang="en-US" dirty="0"/>
+              <a:t>。</a:t>
+            </a:r>
+            <a:endParaRPr lang="en-US" altLang="zh-CN" dirty="0"/>
+          </a:p>
+          <a:p>
+            <a:r>
+              <a:rPr lang="en-US" altLang="zh-CN" dirty="0"/>
+              <a:t>Machine learning vs Deep learning vs Reinforcement learning</a:t>
+            </a:r>
+          </a:p>
+          <a:p>
+            <a:r>
+              <a:rPr lang="en-US" altLang="zh-CN" dirty="0"/>
+              <a:t> </a:t>
+            </a:r>
+            <a:endParaRPr lang="zh-CN" altLang="en-US" dirty="0"/>
           </a:p>
         </p:txBody>
       </p:sp>
@@ -3840,7 +6339,11 @@
           <a:bodyPr/>
           <a:lstStyle/>
           <a:p>
-            <a:endParaRPr lang="zh-CN" altLang="en-US"/>
+            <a:r>
+              <a:rPr lang="en-US" altLang="zh-CN" dirty="0"/>
+              <a:t>Core Elements- value function</a:t>
+            </a:r>
+            <a:endParaRPr lang="zh-CN" altLang="en-US" dirty="0"/>
           </a:p>
         </p:txBody>
       </p:sp>
@@ -3865,7 +6368,37 @@
           <a:bodyPr/>
           <a:lstStyle/>
           <a:p>
-            <a:endParaRPr lang="zh-CN" altLang="en-US"/>
+            <a:r>
+              <a:rPr lang="en-US" altLang="zh-CN" dirty="0"/>
+              <a:t>DQN</a:t>
+            </a:r>
+          </a:p>
+          <a:p>
+            <a:r>
+              <a:rPr lang="en-US" altLang="zh-CN" dirty="0"/>
+              <a:t>Double DQN</a:t>
+            </a:r>
+          </a:p>
+          <a:p>
+            <a:r>
+              <a:rPr lang="en-US" altLang="zh-CN" dirty="0"/>
+              <a:t>Prioritized experience replay</a:t>
+            </a:r>
+          </a:p>
+          <a:p>
+            <a:r>
+              <a:rPr lang="en-US" altLang="zh-CN" dirty="0"/>
+              <a:t>Dueling DQN</a:t>
+            </a:r>
+          </a:p>
+          <a:p>
+            <a:r>
+              <a:rPr lang="en-US" altLang="zh-CN" dirty="0"/>
+              <a:t>PGQ - policy gradient and Q-learning (PGQ)</a:t>
+            </a:r>
+          </a:p>
+          <a:p>
+            <a:endParaRPr lang="zh-CN" altLang="en-US" dirty="0"/>
           </a:p>
         </p:txBody>
       </p:sp>
@@ -3873,6 +6406,409 @@
     <p:extLst>
       <p:ext uri="{BB962C8B-B14F-4D97-AF65-F5344CB8AC3E}">
         <p14:creationId xmlns:p14="http://schemas.microsoft.com/office/powerpoint/2010/main" val="1153789875"/>
+      </p:ext>
+    </p:extLst>
+  </p:cSld>
+  <p:clrMapOvr>
+    <a:masterClrMapping/>
+  </p:clrMapOvr>
+</p:sld>
+</file>
+
+<file path=ppt/slides/slide7.xml><?xml version="1.0" encoding="utf-8"?>
+<p:sld xmlns:a="http://schemas.openxmlformats.org/drawingml/2006/main" xmlns:r="http://schemas.openxmlformats.org/officeDocument/2006/relationships" xmlns:p="http://schemas.openxmlformats.org/presentationml/2006/main">
+  <p:cSld>
+    <p:spTree>
+      <p:nvGrpSpPr>
+        <p:cNvPr id="1" name=""/>
+        <p:cNvGrpSpPr/>
+        <p:nvPr/>
+      </p:nvGrpSpPr>
+      <p:grpSpPr>
+        <a:xfrm>
+          <a:off x="0" y="0"/>
+          <a:ext cx="0" cy="0"/>
+          <a:chOff x="0" y="0"/>
+          <a:chExt cx="0" cy="0"/>
+        </a:xfrm>
+      </p:grpSpPr>
+      <p:sp>
+        <p:nvSpPr>
+          <p:cNvPr id="2" name="标题 1">
+            <a:extLst>
+              <a:ext uri="{FF2B5EF4-FFF2-40B4-BE49-F238E27FC236}">
+                <a16:creationId xmlns:a16="http://schemas.microsoft.com/office/drawing/2014/main" id="{6279F4E5-0ABF-427C-ADFB-10AEB275DB51}"/>
+              </a:ext>
+            </a:extLst>
+          </p:cNvPr>
+          <p:cNvSpPr>
+            <a:spLocks noGrp="1"/>
+          </p:cNvSpPr>
+          <p:nvPr>
+            <p:ph type="title"/>
+          </p:nvPr>
+        </p:nvSpPr>
+        <p:spPr/>
+        <p:txBody>
+          <a:bodyPr/>
+          <a:lstStyle/>
+          <a:p>
+            <a:r>
+              <a:rPr lang="en-US" altLang="zh-CN" dirty="0"/>
+              <a:t>Core Elements- policy</a:t>
+            </a:r>
+            <a:endParaRPr lang="zh-CN" altLang="en-US" dirty="0"/>
+          </a:p>
+        </p:txBody>
+      </p:sp>
+      <p:sp>
+        <p:nvSpPr>
+          <p:cNvPr id="3" name="内容占位符 2">
+            <a:extLst>
+              <a:ext uri="{FF2B5EF4-FFF2-40B4-BE49-F238E27FC236}">
+                <a16:creationId xmlns:a16="http://schemas.microsoft.com/office/drawing/2014/main" id="{AC6AA349-E310-4248-8D43-04D355BA690C}"/>
+              </a:ext>
+            </a:extLst>
+          </p:cNvPr>
+          <p:cNvSpPr>
+            <a:spLocks noGrp="1"/>
+          </p:cNvSpPr>
+          <p:nvPr>
+            <p:ph idx="1"/>
+          </p:nvPr>
+        </p:nvSpPr>
+        <p:spPr/>
+        <p:txBody>
+          <a:bodyPr/>
+          <a:lstStyle/>
+          <a:p>
+            <a:r>
+              <a:rPr lang="en-US" altLang="zh-CN" dirty="0"/>
+              <a:t>PG</a:t>
+            </a:r>
+          </a:p>
+          <a:p>
+            <a:r>
+              <a:rPr lang="en-US" altLang="zh-CN" dirty="0"/>
+              <a:t>AC</a:t>
+            </a:r>
+          </a:p>
+          <a:p>
+            <a:r>
+              <a:rPr lang="en-US" altLang="zh-CN" dirty="0"/>
+              <a:t>Deterministic PG</a:t>
+            </a:r>
+          </a:p>
+          <a:p>
+            <a:r>
+              <a:rPr lang="en-US" altLang="zh-CN" dirty="0"/>
+              <a:t>Deep Deterministic PG</a:t>
+            </a:r>
+          </a:p>
+          <a:p>
+            <a:r>
+              <a:rPr lang="en-US" altLang="zh-CN" dirty="0"/>
+              <a:t>TRPO</a:t>
+            </a:r>
+          </a:p>
+          <a:p>
+            <a:r>
+              <a:rPr lang="en-US" altLang="zh-CN" dirty="0"/>
+              <a:t>PPO</a:t>
+            </a:r>
+          </a:p>
+          <a:p>
+            <a:r>
+              <a:rPr lang="en-US" altLang="zh-CN" dirty="0"/>
+              <a:t>ACTAR</a:t>
+            </a:r>
+          </a:p>
+        </p:txBody>
+      </p:sp>
+    </p:spTree>
+    <p:extLst>
+      <p:ext uri="{BB962C8B-B14F-4D97-AF65-F5344CB8AC3E}">
+        <p14:creationId xmlns:p14="http://schemas.microsoft.com/office/powerpoint/2010/main" val="119637362"/>
+      </p:ext>
+    </p:extLst>
+  </p:cSld>
+  <p:clrMapOvr>
+    <a:masterClrMapping/>
+  </p:clrMapOvr>
+</p:sld>
+</file>
+
+<file path=ppt/slides/slide8.xml><?xml version="1.0" encoding="utf-8"?>
+<p:sld xmlns:a="http://schemas.openxmlformats.org/drawingml/2006/main" xmlns:r="http://schemas.openxmlformats.org/officeDocument/2006/relationships" xmlns:p="http://schemas.openxmlformats.org/presentationml/2006/main">
+  <p:cSld>
+    <p:spTree>
+      <p:nvGrpSpPr>
+        <p:cNvPr id="1" name=""/>
+        <p:cNvGrpSpPr/>
+        <p:nvPr/>
+      </p:nvGrpSpPr>
+      <p:grpSpPr>
+        <a:xfrm>
+          <a:off x="0" y="0"/>
+          <a:ext cx="0" cy="0"/>
+          <a:chOff x="0" y="0"/>
+          <a:chExt cx="0" cy="0"/>
+        </a:xfrm>
+      </p:grpSpPr>
+      <p:sp>
+        <p:nvSpPr>
+          <p:cNvPr id="2" name="标题 1">
+            <a:extLst>
+              <a:ext uri="{FF2B5EF4-FFF2-40B4-BE49-F238E27FC236}">
+                <a16:creationId xmlns:a16="http://schemas.microsoft.com/office/drawing/2014/main" id="{A930643A-8D0A-425C-A850-3C4BDDADAA89}"/>
+              </a:ext>
+            </a:extLst>
+          </p:cNvPr>
+          <p:cNvSpPr>
+            <a:spLocks noGrp="1"/>
+          </p:cNvSpPr>
+          <p:nvPr>
+            <p:ph type="title"/>
+          </p:nvPr>
+        </p:nvSpPr>
+        <p:spPr/>
+        <p:txBody>
+          <a:bodyPr/>
+          <a:lstStyle/>
+          <a:p>
+            <a:r>
+              <a:rPr lang="en-US" altLang="zh-CN" dirty="0"/>
+              <a:t>Core Elements- reward</a:t>
+            </a:r>
+            <a:endParaRPr lang="zh-CN" altLang="en-US" dirty="0"/>
+          </a:p>
+        </p:txBody>
+      </p:sp>
+      <p:sp>
+        <p:nvSpPr>
+          <p:cNvPr id="3" name="内容占位符 2">
+            <a:extLst>
+              <a:ext uri="{FF2B5EF4-FFF2-40B4-BE49-F238E27FC236}">
+                <a16:creationId xmlns:a16="http://schemas.microsoft.com/office/drawing/2014/main" id="{4CE50D7E-09E7-4F6C-910D-5ABA3A3D6FA4}"/>
+              </a:ext>
+            </a:extLst>
+          </p:cNvPr>
+          <p:cNvSpPr>
+            <a:spLocks noGrp="1"/>
+          </p:cNvSpPr>
+          <p:nvPr>
+            <p:ph idx="1"/>
+          </p:nvPr>
+        </p:nvSpPr>
+        <p:spPr/>
+        <p:txBody>
+          <a:bodyPr/>
+          <a:lstStyle/>
+          <a:p>
+            <a:r>
+              <a:rPr lang="en-US" altLang="zh-CN" dirty="0"/>
+              <a:t>Imitation learning </a:t>
+            </a:r>
+          </a:p>
+          <a:p>
+            <a:pPr lvl="1"/>
+            <a:r>
+              <a:rPr lang="en-US" altLang="zh-CN" dirty="0"/>
+              <a:t>Behavior cloning </a:t>
+            </a:r>
+          </a:p>
+          <a:p>
+            <a:pPr lvl="1"/>
+            <a:r>
+              <a:rPr lang="en-US" altLang="zh-CN" dirty="0"/>
+              <a:t>Inverse reinforcement learning </a:t>
+            </a:r>
+          </a:p>
+          <a:p>
+            <a:r>
+              <a:rPr lang="en-US" altLang="zh-CN" dirty="0"/>
+              <a:t>GAIL</a:t>
+            </a:r>
+          </a:p>
+          <a:p>
+            <a:r>
+              <a:rPr lang="en-US" altLang="zh-CN" dirty="0"/>
+              <a:t>Learning from  demonstration</a:t>
+            </a:r>
+          </a:p>
+          <a:p>
+            <a:pPr lvl="1"/>
+            <a:r>
+              <a:rPr lang="en-US" altLang="zh-CN" dirty="0"/>
+              <a:t>DQFD</a:t>
+            </a:r>
+          </a:p>
+          <a:p>
+            <a:pPr lvl="1"/>
+            <a:r>
+              <a:rPr lang="en-US" altLang="zh-CN" dirty="0"/>
+              <a:t>AlphaGo</a:t>
+            </a:r>
+          </a:p>
+          <a:p>
+            <a:r>
+              <a:rPr lang="en-US" altLang="zh-CN" dirty="0"/>
+              <a:t>Third person imitation learning</a:t>
+            </a:r>
+          </a:p>
+          <a:p>
+            <a:endParaRPr lang="zh-CN" altLang="en-US" dirty="0"/>
+          </a:p>
+        </p:txBody>
+      </p:sp>
+    </p:spTree>
+    <p:extLst>
+      <p:ext uri="{BB962C8B-B14F-4D97-AF65-F5344CB8AC3E}">
+        <p14:creationId xmlns:p14="http://schemas.microsoft.com/office/powerpoint/2010/main" val="3730331744"/>
+      </p:ext>
+    </p:extLst>
+  </p:cSld>
+  <p:clrMapOvr>
+    <a:masterClrMapping/>
+  </p:clrMapOvr>
+</p:sld>
+</file>
+
+<file path=ppt/slides/slide9.xml><?xml version="1.0" encoding="utf-8"?>
+<p:sld xmlns:a="http://schemas.openxmlformats.org/drawingml/2006/main" xmlns:r="http://schemas.openxmlformats.org/officeDocument/2006/relationships" xmlns:p="http://schemas.openxmlformats.org/presentationml/2006/main">
+  <p:cSld>
+    <p:spTree>
+      <p:nvGrpSpPr>
+        <p:cNvPr id="1" name=""/>
+        <p:cNvGrpSpPr/>
+        <p:nvPr/>
+      </p:nvGrpSpPr>
+      <p:grpSpPr>
+        <a:xfrm>
+          <a:off x="0" y="0"/>
+          <a:ext cx="0" cy="0"/>
+          <a:chOff x="0" y="0"/>
+          <a:chExt cx="0" cy="0"/>
+        </a:xfrm>
+      </p:grpSpPr>
+      <p:sp>
+        <p:nvSpPr>
+          <p:cNvPr id="2" name="标题 1">
+            <a:extLst>
+              <a:ext uri="{FF2B5EF4-FFF2-40B4-BE49-F238E27FC236}">
+                <a16:creationId xmlns:a16="http://schemas.microsoft.com/office/drawing/2014/main" id="{00DAD0F0-6A65-43D5-A47D-CB3097D8A1C9}"/>
+              </a:ext>
+            </a:extLst>
+          </p:cNvPr>
+          <p:cNvSpPr>
+            <a:spLocks noGrp="1"/>
+          </p:cNvSpPr>
+          <p:nvPr>
+            <p:ph type="title"/>
+          </p:nvPr>
+        </p:nvSpPr>
+        <p:spPr/>
+        <p:txBody>
+          <a:bodyPr/>
+          <a:lstStyle/>
+          <a:p>
+            <a:r>
+              <a:rPr lang="en-US" altLang="zh-CN" dirty="0"/>
+              <a:t>Core Elements- model</a:t>
+            </a:r>
+            <a:endParaRPr lang="zh-CN" altLang="en-US" dirty="0"/>
+          </a:p>
+        </p:txBody>
+      </p:sp>
+      <p:sp>
+        <p:nvSpPr>
+          <p:cNvPr id="3" name="内容占位符 2">
+            <a:extLst>
+              <a:ext uri="{FF2B5EF4-FFF2-40B4-BE49-F238E27FC236}">
+                <a16:creationId xmlns:a16="http://schemas.microsoft.com/office/drawing/2014/main" id="{9E0463A5-ADD5-41B4-8748-3A4ED22E8E38}"/>
+              </a:ext>
+            </a:extLst>
+          </p:cNvPr>
+          <p:cNvSpPr>
+            <a:spLocks noGrp="1"/>
+          </p:cNvSpPr>
+          <p:nvPr>
+            <p:ph idx="1"/>
+          </p:nvPr>
+        </p:nvSpPr>
+        <p:spPr/>
+        <p:txBody>
+          <a:bodyPr/>
+          <a:lstStyle/>
+          <a:p>
+            <a:r>
+              <a:rPr lang="en-US" altLang="zh-CN" dirty="0"/>
+              <a:t>Model based RL</a:t>
+            </a:r>
+          </a:p>
+          <a:p>
+            <a:pPr lvl="1"/>
+            <a:r>
+              <a:rPr lang="en-US" altLang="zh-CN" dirty="0"/>
+              <a:t> guided policy search (GPS) (Levine etal.,2016a)</a:t>
+            </a:r>
+          </a:p>
+          <a:p>
+            <a:pPr lvl="1"/>
+            <a:r>
+              <a:rPr lang="da-DK" altLang="zh-CN" dirty="0"/>
+              <a:t>Gu et al. (2016b); </a:t>
+            </a:r>
+          </a:p>
+          <a:p>
+            <a:pPr lvl="1"/>
+            <a:r>
+              <a:rPr lang="da-DK" altLang="zh-CN" dirty="0"/>
+              <a:t>Henaff et al. (2017); </a:t>
+            </a:r>
+          </a:p>
+          <a:p>
+            <a:pPr lvl="1"/>
+            <a:r>
+              <a:rPr lang="da-DK" altLang="zh-CN" dirty="0"/>
+              <a:t>Hester and Stone (2017); </a:t>
+            </a:r>
+          </a:p>
+          <a:p>
+            <a:pPr lvl="1"/>
+            <a:r>
+              <a:rPr lang="da-DK" altLang="zh-CN" dirty="0"/>
+              <a:t>Oh et al. (2017); </a:t>
+            </a:r>
+          </a:p>
+          <a:p>
+            <a:pPr lvl="1"/>
+            <a:r>
+              <a:rPr lang="da-DK" altLang="zh-CN" dirty="0"/>
+              <a:t>Watter et al. (2015).</a:t>
+            </a:r>
+          </a:p>
+          <a:p>
+            <a:pPr lvl="1"/>
+            <a:r>
+              <a:rPr lang="da-DK" altLang="zh-CN" dirty="0"/>
+              <a:t>World models </a:t>
+            </a:r>
+          </a:p>
+          <a:p>
+            <a:pPr lvl="1"/>
+            <a:r>
+              <a:rPr lang="da-DK" altLang="zh-CN" dirty="0"/>
+              <a:t>Model based RL in Ataris </a:t>
+            </a:r>
+            <a:endParaRPr lang="zh-CN" altLang="en-US" dirty="0"/>
+          </a:p>
+        </p:txBody>
+      </p:sp>
+    </p:spTree>
+    <p:extLst>
+      <p:ext uri="{BB962C8B-B14F-4D97-AF65-F5344CB8AC3E}">
+        <p14:creationId xmlns:p14="http://schemas.microsoft.com/office/powerpoint/2010/main" val="2987515268"/>
       </p:ext>
     </p:extLst>
   </p:cSld>
@@ -4175,4 +7111,299 @@
     </a:ext>
   </a:extLst>
 </a:theme>
+</file>
+
+<file path=ppt/theme/theme2.xml><?xml version="1.0" encoding="utf-8"?>
+<a:theme xmlns:a="http://schemas.openxmlformats.org/drawingml/2006/main" name="Office 主题​​">
+  <a:themeElements>
+    <a:clrScheme name="Office">
+      <a:dk1>
+        <a:sysClr val="windowText" lastClr="000000"/>
+      </a:dk1>
+      <a:lt1>
+        <a:sysClr val="window" lastClr="FFFFFF"/>
+      </a:lt1>
+      <a:dk2>
+        <a:srgbClr val="44546A"/>
+      </a:dk2>
+      <a:lt2>
+        <a:srgbClr val="E7E6E6"/>
+      </a:lt2>
+      <a:accent1>
+        <a:srgbClr val="4472C4"/>
+      </a:accent1>
+      <a:accent2>
+        <a:srgbClr val="ED7D31"/>
+      </a:accent2>
+      <a:accent3>
+        <a:srgbClr val="A5A5A5"/>
+      </a:accent3>
+      <a:accent4>
+        <a:srgbClr val="FFC000"/>
+      </a:accent4>
+      <a:accent5>
+        <a:srgbClr val="5B9BD5"/>
+      </a:accent5>
+      <a:accent6>
+        <a:srgbClr val="70AD47"/>
+      </a:accent6>
+      <a:hlink>
+        <a:srgbClr val="0563C1"/>
+      </a:hlink>
+      <a:folHlink>
+        <a:srgbClr val="954F72"/>
+      </a:folHlink>
+    </a:clrScheme>
+    <a:fontScheme name="Office">
+      <a:majorFont>
+        <a:latin typeface="等线 Light" panose="020F0302020204030204"/>
+        <a:ea typeface=""/>
+        <a:cs typeface=""/>
+        <a:font script="Jpan" typeface="游ゴシック Light"/>
+        <a:font script="Hang" typeface="맑은 고딕"/>
+        <a:font script="Hans" typeface="等线 Light"/>
+        <a:font script="Hant" typeface="新細明體"/>
+        <a:font script="Arab" typeface="Times New Roman"/>
+        <a:font script="Hebr" typeface="Times New Roman"/>
+        <a:font script="Thai" typeface="Angsana New"/>
+        <a:font script="Ethi" typeface="Nyala"/>
+        <a:font script="Beng" typeface="Vrinda"/>
+        <a:font script="Gujr" typeface="Shruti"/>
+        <a:font script="Khmr" typeface="MoolBoran"/>
+        <a:font script="Knda" typeface="Tunga"/>
+        <a:font script="Guru" typeface="Raavi"/>
+        <a:font script="Cans" typeface="Euphemia"/>
+        <a:font script="Cher" typeface="Plantagenet Cherokee"/>
+        <a:font script="Yiii" typeface="Microsoft Yi Baiti"/>
+        <a:font script="Tibt" typeface="Microsoft Himalaya"/>
+        <a:font script="Thaa" typeface="MV Boli"/>
+        <a:font script="Deva" typeface="Mangal"/>
+        <a:font script="Telu" typeface="Gautami"/>
+        <a:font script="Taml" typeface="Latha"/>
+        <a:font script="Syrc" typeface="Estrangelo Edessa"/>
+        <a:font script="Orya" typeface="Kalinga"/>
+        <a:font script="Mlym" typeface="Kartika"/>
+        <a:font script="Laoo" typeface="DokChampa"/>
+        <a:font script="Sinh" typeface="Iskoola Pota"/>
+        <a:font script="Mong" typeface="Mongolian Baiti"/>
+        <a:font script="Viet" typeface="Times New Roman"/>
+        <a:font script="Uigh" typeface="Microsoft Uighur"/>
+        <a:font script="Geor" typeface="Sylfaen"/>
+        <a:font script="Armn" typeface="Arial"/>
+        <a:font script="Bugi" typeface="Leelawadee UI"/>
+        <a:font script="Bopo" typeface="Microsoft JhengHei"/>
+        <a:font script="Java" typeface="Javanese Text"/>
+        <a:font script="Lisu" typeface="Segoe UI"/>
+        <a:font script="Mymr" typeface="Myanmar Text"/>
+        <a:font script="Nkoo" typeface="Ebrima"/>
+        <a:font script="Olck" typeface="Nirmala UI"/>
+        <a:font script="Osma" typeface="Ebrima"/>
+        <a:font script="Phag" typeface="Phagspa"/>
+        <a:font script="Syrn" typeface="Estrangelo Edessa"/>
+        <a:font script="Syrj" typeface="Estrangelo Edessa"/>
+        <a:font script="Syre" typeface="Estrangelo Edessa"/>
+        <a:font script="Sora" typeface="Nirmala UI"/>
+        <a:font script="Tale" typeface="Microsoft Tai Le"/>
+        <a:font script="Talu" typeface="Microsoft New Tai Lue"/>
+        <a:font script="Tfng" typeface="Ebrima"/>
+      </a:majorFont>
+      <a:minorFont>
+        <a:latin typeface="等线" panose="020F0502020204030204"/>
+        <a:ea typeface=""/>
+        <a:cs typeface=""/>
+        <a:font script="Jpan" typeface="游ゴシック"/>
+        <a:font script="Hang" typeface="맑은 고딕"/>
+        <a:font script="Hans" typeface="等线"/>
+        <a:font script="Hant" typeface="新細明體"/>
+        <a:font script="Arab" typeface="Arial"/>
+        <a:font script="Hebr" typeface="Arial"/>
+        <a:font script="Thai" typeface="Cordia New"/>
+        <a:font script="Ethi" typeface="Nyala"/>
+        <a:font script="Beng" typeface="Vrinda"/>
+        <a:font script="Gujr" typeface="Shruti"/>
+        <a:font script="Khmr" typeface="DaunPenh"/>
+        <a:font script="Knda" typeface="Tunga"/>
+        <a:font script="Guru" typeface="Raavi"/>
+        <a:font script="Cans" typeface="Euphemia"/>
+        <a:font script="Cher" typeface="Plantagenet Cherokee"/>
+        <a:font script="Yiii" typeface="Microsoft Yi Baiti"/>
+        <a:font script="Tibt" typeface="Microsoft Himalaya"/>
+        <a:font script="Thaa" typeface="MV Boli"/>
+        <a:font script="Deva" typeface="Mangal"/>
+        <a:font script="Telu" typeface="Gautami"/>
+        <a:font script="Taml" typeface="Latha"/>
+        <a:font script="Syrc" typeface="Estrangelo Edessa"/>
+        <a:font script="Orya" typeface="Kalinga"/>
+        <a:font script="Mlym" typeface="Kartika"/>
+        <a:font script="Laoo" typeface="DokChampa"/>
+        <a:font script="Sinh" typeface="Iskoola Pota"/>
+        <a:font script="Mong" typeface="Mongolian Baiti"/>
+        <a:font script="Viet" typeface="Arial"/>
+        <a:font script="Uigh" typeface="Microsoft Uighur"/>
+        <a:font script="Geor" typeface="Sylfaen"/>
+        <a:font script="Armn" typeface="Arial"/>
+        <a:font script="Bugi" typeface="Leelawadee UI"/>
+        <a:font script="Bopo" typeface="Microsoft JhengHei"/>
+        <a:font script="Java" typeface="Javanese Text"/>
+        <a:font script="Lisu" typeface="Segoe UI"/>
+        <a:font script="Mymr" typeface="Myanmar Text"/>
+        <a:font script="Nkoo" typeface="Ebrima"/>
+        <a:font script="Olck" typeface="Nirmala UI"/>
+        <a:font script="Osma" typeface="Ebrima"/>
+        <a:font script="Phag" typeface="Phagspa"/>
+        <a:font script="Syrn" typeface="Estrangelo Edessa"/>
+        <a:font script="Syrj" typeface="Estrangelo Edessa"/>
+        <a:font script="Syre" typeface="Estrangelo Edessa"/>
+        <a:font script="Sora" typeface="Nirmala UI"/>
+        <a:font script="Tale" typeface="Microsoft Tai Le"/>
+        <a:font script="Talu" typeface="Microsoft New Tai Lue"/>
+        <a:font script="Tfng" typeface="Ebrima"/>
+      </a:minorFont>
+    </a:fontScheme>
+    <a:fmtScheme name="Office">
+      <a:fillStyleLst>
+        <a:solidFill>
+          <a:schemeClr val="phClr"/>
+        </a:solidFill>
+        <a:gradFill rotWithShape="1">
+          <a:gsLst>
+            <a:gs pos="0">
+              <a:schemeClr val="phClr">
+                <a:lumMod val="110000"/>
+                <a:satMod val="105000"/>
+                <a:tint val="67000"/>
+              </a:schemeClr>
+            </a:gs>
+            <a:gs pos="50000">
+              <a:schemeClr val="phClr">
+                <a:lumMod val="105000"/>
+                <a:satMod val="103000"/>
+                <a:tint val="73000"/>
+              </a:schemeClr>
+            </a:gs>
+            <a:gs pos="100000">
+              <a:schemeClr val="phClr">
+                <a:lumMod val="105000"/>
+                <a:satMod val="109000"/>
+                <a:tint val="81000"/>
+              </a:schemeClr>
+            </a:gs>
+          </a:gsLst>
+          <a:lin ang="5400000" scaled="0"/>
+        </a:gradFill>
+        <a:gradFill rotWithShape="1">
+          <a:gsLst>
+            <a:gs pos="0">
+              <a:schemeClr val="phClr">
+                <a:satMod val="103000"/>
+                <a:lumMod val="102000"/>
+                <a:tint val="94000"/>
+              </a:schemeClr>
+            </a:gs>
+            <a:gs pos="50000">
+              <a:schemeClr val="phClr">
+                <a:satMod val="110000"/>
+                <a:lumMod val="100000"/>
+                <a:shade val="100000"/>
+              </a:schemeClr>
+            </a:gs>
+            <a:gs pos="100000">
+              <a:schemeClr val="phClr">
+                <a:lumMod val="99000"/>
+                <a:satMod val="120000"/>
+                <a:shade val="78000"/>
+              </a:schemeClr>
+            </a:gs>
+          </a:gsLst>
+          <a:lin ang="5400000" scaled="0"/>
+        </a:gradFill>
+      </a:fillStyleLst>
+      <a:lnStyleLst>
+        <a:ln w="6350" cap="flat" cmpd="sng" algn="ctr">
+          <a:solidFill>
+            <a:schemeClr val="phClr"/>
+          </a:solidFill>
+          <a:prstDash val="solid"/>
+          <a:miter lim="800000"/>
+        </a:ln>
+        <a:ln w="12700" cap="flat" cmpd="sng" algn="ctr">
+          <a:solidFill>
+            <a:schemeClr val="phClr"/>
+          </a:solidFill>
+          <a:prstDash val="solid"/>
+          <a:miter lim="800000"/>
+        </a:ln>
+        <a:ln w="19050" cap="flat" cmpd="sng" algn="ctr">
+          <a:solidFill>
+            <a:schemeClr val="phClr"/>
+          </a:solidFill>
+          <a:prstDash val="solid"/>
+          <a:miter lim="800000"/>
+        </a:ln>
+      </a:lnStyleLst>
+      <a:effectStyleLst>
+        <a:effectStyle>
+          <a:effectLst/>
+        </a:effectStyle>
+        <a:effectStyle>
+          <a:effectLst/>
+        </a:effectStyle>
+        <a:effectStyle>
+          <a:effectLst>
+            <a:outerShdw blurRad="57150" dist="19050" dir="5400000" algn="ctr" rotWithShape="0">
+              <a:srgbClr val="000000">
+                <a:alpha val="63000"/>
+              </a:srgbClr>
+            </a:outerShdw>
+          </a:effectLst>
+        </a:effectStyle>
+      </a:effectStyleLst>
+      <a:bgFillStyleLst>
+        <a:solidFill>
+          <a:schemeClr val="phClr"/>
+        </a:solidFill>
+        <a:solidFill>
+          <a:schemeClr val="phClr">
+            <a:tint val="95000"/>
+            <a:satMod val="170000"/>
+          </a:schemeClr>
+        </a:solidFill>
+        <a:gradFill rotWithShape="1">
+          <a:gsLst>
+            <a:gs pos="0">
+              <a:schemeClr val="phClr">
+                <a:tint val="93000"/>
+                <a:satMod val="150000"/>
+                <a:shade val="98000"/>
+                <a:lumMod val="102000"/>
+              </a:schemeClr>
+            </a:gs>
+            <a:gs pos="50000">
+              <a:schemeClr val="phClr">
+                <a:tint val="98000"/>
+                <a:satMod val="130000"/>
+                <a:shade val="90000"/>
+                <a:lumMod val="103000"/>
+              </a:schemeClr>
+            </a:gs>
+            <a:gs pos="100000">
+              <a:schemeClr val="phClr">
+                <a:shade val="63000"/>
+                <a:satMod val="120000"/>
+              </a:schemeClr>
+            </a:gs>
+          </a:gsLst>
+          <a:lin ang="5400000" scaled="0"/>
+        </a:gradFill>
+      </a:bgFillStyleLst>
+    </a:fmtScheme>
+  </a:themeElements>
+  <a:objectDefaults/>
+  <a:extraClrSchemeLst/>
+  <a:extLst>
+    <a:ext uri="{05A4C25C-085E-4340-85A3-A5531E510DB2}">
+      <thm15:themeFamily xmlns:thm15="http://schemas.microsoft.com/office/thememl/2012/main" name="Office Theme" id="{62F939B6-93AF-4DB8-9C6B-D6C7DFDC589F}" vid="{4A3C46E8-61CC-4603-A589-7422A47A8E4A}"/>
+    </a:ext>
+  </a:extLst>
+</a:theme>
 </file>
</xml_diff>